<commit_message>
Gabor done; wrap up report
Gabor is finished and good data is collected. Report needs to be completed and Ideally some images of laplacian pyramids and gabor filters should be included.

Deadline extended to March 22nd as well.
</commit_message>
<xml_diff>
--- a/project_report.pptx
+++ b/project_report.pptx
@@ -5,24 +5,30 @@
     <p:sldMasterId id="2147483660" r:id="rId1"/>
   </p:sldMasterIdLst>
   <p:notesMasterIdLst>
-    <p:notesMasterId r:id="rId17"/>
+    <p:notesMasterId r:id="rId23"/>
   </p:notesMasterIdLst>
   <p:sldIdLst>
     <p:sldId id="256" r:id="rId2"/>
     <p:sldId id="257" r:id="rId3"/>
     <p:sldId id="258" r:id="rId4"/>
-    <p:sldId id="265" r:id="rId5"/>
-    <p:sldId id="266" r:id="rId6"/>
-    <p:sldId id="275" r:id="rId7"/>
-    <p:sldId id="283" r:id="rId8"/>
-    <p:sldId id="284" r:id="rId9"/>
-    <p:sldId id="285" r:id="rId10"/>
-    <p:sldId id="282" r:id="rId11"/>
-    <p:sldId id="286" r:id="rId12"/>
-    <p:sldId id="287" r:id="rId13"/>
-    <p:sldId id="288" r:id="rId14"/>
-    <p:sldId id="260" r:id="rId15"/>
-    <p:sldId id="267" r:id="rId16"/>
+    <p:sldId id="290" r:id="rId5"/>
+    <p:sldId id="291" r:id="rId6"/>
+    <p:sldId id="265" r:id="rId7"/>
+    <p:sldId id="266" r:id="rId8"/>
+    <p:sldId id="292" r:id="rId9"/>
+    <p:sldId id="275" r:id="rId10"/>
+    <p:sldId id="283" r:id="rId11"/>
+    <p:sldId id="284" r:id="rId12"/>
+    <p:sldId id="285" r:id="rId13"/>
+    <p:sldId id="282" r:id="rId14"/>
+    <p:sldId id="286" r:id="rId15"/>
+    <p:sldId id="287" r:id="rId16"/>
+    <p:sldId id="288" r:id="rId17"/>
+    <p:sldId id="293" r:id="rId18"/>
+    <p:sldId id="294" r:id="rId19"/>
+    <p:sldId id="295" r:id="rId20"/>
+    <p:sldId id="260" r:id="rId21"/>
+    <p:sldId id="267" r:id="rId22"/>
   </p:sldIdLst>
   <p:sldSz cx="12192000" cy="6858000"/>
   <p:notesSz cx="6858000" cy="9144000"/>
@@ -6320,10 +6326,10 @@
       </p:grpSpPr>
       <p:sp>
         <p:nvSpPr>
-          <p:cNvPr id="2" name="Title 1">
+          <p:cNvPr id="6" name="Title 5">
             <a:extLst>
               <a:ext uri="{FF2B5EF4-FFF2-40B4-BE49-F238E27FC236}">
-                <a16:creationId xmlns:a16="http://schemas.microsoft.com/office/drawing/2014/main" id="{051CE146-45EF-9947-47C9-86FF29FDB35D}"/>
+                <a16:creationId xmlns:a16="http://schemas.microsoft.com/office/drawing/2014/main" id="{6CE6A214-F671-652C-E904-D3EEBD96CB19}"/>
               </a:ext>
             </a:extLst>
           </p:cNvPr>
@@ -6341,17 +6347,17 @@
           <a:p>
             <a:r>
               <a:rPr lang="en-US" dirty="0"/>
-              <a:t>Best Result Laplacian</a:t>
-            </a:r>
-          </a:p>
-        </p:txBody>
-      </p:sp>
-      <p:sp>
-        <p:nvSpPr>
-          <p:cNvPr id="3" name="Content Placeholder 2">
+              <a:t>Observations – Variance All Layers</a:t>
+            </a:r>
+          </a:p>
+        </p:txBody>
+      </p:sp>
+      <p:sp>
+        <p:nvSpPr>
+          <p:cNvPr id="7" name="Content Placeholder 6">
             <a:extLst>
               <a:ext uri="{FF2B5EF4-FFF2-40B4-BE49-F238E27FC236}">
-                <a16:creationId xmlns:a16="http://schemas.microsoft.com/office/drawing/2014/main" id="{D3D570C5-97DA-D245-0DBF-B43DAE650B50}"/>
+                <a16:creationId xmlns:a16="http://schemas.microsoft.com/office/drawing/2014/main" id="{99B16345-D877-FE81-27F0-BC411183D798}"/>
               </a:ext>
             </a:extLst>
           </p:cNvPr>
@@ -6364,69 +6370,69 @@
         </p:nvSpPr>
         <p:spPr/>
         <p:txBody>
-          <a:bodyPr/>
+          <a:bodyPr>
+            <a:normAutofit fontScale="92500" lnSpcReduction="20000"/>
+          </a:bodyPr>
           <a:lstStyle/>
           <a:p>
             <a:r>
               <a:rPr lang="en-US" dirty="0"/>
-              <a:t>Use 4 layers where </a:t>
-            </a:r>
-            <a:r>
-              <a:rPr lang="en-US" u="sng" dirty="0"/>
-              <a:t>layer 1 is the smallest and 4 is the largest</a:t>
-            </a:r>
+              <a:t>Number of Layers = 1   12.3390</a:t>
+            </a:r>
+          </a:p>
+          <a:p>
+            <a:endParaRPr lang="en-US" dirty="0"/>
+          </a:p>
+          <a:p>
             <a:r>
               <a:rPr lang="en-US" dirty="0"/>
-              <a:t>. The Laplacian pyramid toolbox outputs the layers in order from smallest to largest. </a:t>
-            </a:r>
-          </a:p>
-          <a:p>
-            <a:pPr lvl="1"/>
+              <a:t>Number of Layers = 2   39.7458</a:t>
+            </a:r>
+          </a:p>
+          <a:p>
+            <a:endParaRPr lang="en-US" dirty="0"/>
+          </a:p>
+          <a:p>
             <a:r>
               <a:rPr lang="en-US" dirty="0"/>
-              <a:t>Mean of layer 1</a:t>
-            </a:r>
-          </a:p>
-          <a:p>
-            <a:pPr lvl="1"/>
+              <a:t>Number of Layers = 3   50.5932</a:t>
+            </a:r>
+          </a:p>
+          <a:p>
+            <a:endParaRPr lang="en-US" dirty="0"/>
+          </a:p>
+          <a:p>
             <a:r>
               <a:rPr lang="en-US" dirty="0"/>
-              <a:t>Variance of all layers</a:t>
-            </a:r>
-          </a:p>
-          <a:p>
-            <a:pPr lvl="1"/>
+              <a:t>Number of Layers = 4   56.0169</a:t>
+            </a:r>
+          </a:p>
+          <a:p>
+            <a:endParaRPr lang="en-US" dirty="0"/>
+          </a:p>
+          <a:p>
             <a:r>
               <a:rPr lang="en-US" dirty="0"/>
-              <a:t>Skew of layers 2 through 4</a:t>
-            </a:r>
-          </a:p>
-          <a:p>
-            <a:pPr lvl="1"/>
+              <a:t>Number of Layers = 5   54.4068</a:t>
+            </a:r>
+          </a:p>
+          <a:p>
+            <a:endParaRPr lang="en-US" dirty="0"/>
+          </a:p>
+          <a:p>
             <a:r>
               <a:rPr lang="en-US" dirty="0"/>
-              <a:t>Kurtosis of layers 2 through 4</a:t>
-            </a:r>
-          </a:p>
-          <a:p>
-            <a:r>
-              <a:rPr lang="en-US" dirty="0"/>
-              <a:t>PCC = </a:t>
-            </a:r>
-            <a:r>
-              <a:rPr lang="en-US"/>
-              <a:t>74.76%</a:t>
-            </a:r>
-            <a:endParaRPr lang="en-US" dirty="0"/>
-          </a:p>
-        </p:txBody>
-      </p:sp>
-      <p:sp>
-        <p:nvSpPr>
-          <p:cNvPr id="4" name="Slide Number Placeholder 3">
+              <a:t>Best Laplacian PCC is 56.020000% accurate with 4 Layers</a:t>
+            </a:r>
+          </a:p>
+        </p:txBody>
+      </p:sp>
+      <p:sp>
+        <p:nvSpPr>
+          <p:cNvPr id="5" name="Slide Number Placeholder 4">
             <a:extLst>
               <a:ext uri="{FF2B5EF4-FFF2-40B4-BE49-F238E27FC236}">
-                <a16:creationId xmlns:a16="http://schemas.microsoft.com/office/drawing/2014/main" id="{6F1A3A8E-FCEA-909B-B4F5-16DCBAC0DA8C}"/>
+                <a16:creationId xmlns:a16="http://schemas.microsoft.com/office/drawing/2014/main" id="{BDC554BC-4CE8-6077-7D9B-5B1B66D1817A}"/>
               </a:ext>
             </a:extLst>
           </p:cNvPr>
@@ -6446,14 +6452,14 @@
               <a:rPr lang="en-US" smtClean="0"/>
               <a:t>10</a:t>
             </a:fld>
-            <a:endParaRPr lang="en-US" dirty="0"/>
+            <a:endParaRPr lang="en-US"/>
           </a:p>
         </p:txBody>
       </p:sp>
     </p:spTree>
     <p:extLst>
       <p:ext uri="{BB962C8B-B14F-4D97-AF65-F5344CB8AC3E}">
-        <p14:creationId xmlns:p14="http://schemas.microsoft.com/office/powerpoint/2010/main" val="1671826336"/>
+        <p14:creationId xmlns:p14="http://schemas.microsoft.com/office/powerpoint/2010/main" val="387152840"/>
       </p:ext>
     </p:extLst>
   </p:cSld>
@@ -6485,7 +6491,7 @@
           <p:cNvPr id="2" name="Title 1">
             <a:extLst>
               <a:ext uri="{FF2B5EF4-FFF2-40B4-BE49-F238E27FC236}">
-                <a16:creationId xmlns:a16="http://schemas.microsoft.com/office/drawing/2014/main" id="{277D30B6-8EC6-67D2-84E6-BCD2FDC884FB}"/>
+                <a16:creationId xmlns:a16="http://schemas.microsoft.com/office/drawing/2014/main" id="{B1030559-28BB-66AD-2F26-8ABF17004FD0}"/>
               </a:ext>
             </a:extLst>
           </p:cNvPr>
@@ -6503,7 +6509,7 @@
           <a:p>
             <a:r>
               <a:rPr lang="en-US" dirty="0"/>
-              <a:t>Mislabel Observations – Laplacian </a:t>
+              <a:t>Observations – Skew all layers</a:t>
             </a:r>
           </a:p>
         </p:txBody>
@@ -6513,7 +6519,7 @@
           <p:cNvPr id="3" name="Content Placeholder 2">
             <a:extLst>
               <a:ext uri="{FF2B5EF4-FFF2-40B4-BE49-F238E27FC236}">
-                <a16:creationId xmlns:a16="http://schemas.microsoft.com/office/drawing/2014/main" id="{83C88D35-7A94-EA99-97FC-BA8AE38FFEA8}"/>
+                <a16:creationId xmlns:a16="http://schemas.microsoft.com/office/drawing/2014/main" id="{14C757AF-FC5C-6B9C-B060-0C4B046AF918}"/>
               </a:ext>
             </a:extLst>
           </p:cNvPr>
@@ -6526,45 +6532,59 @@
         </p:nvSpPr>
         <p:spPr/>
         <p:txBody>
-          <a:bodyPr/>
+          <a:bodyPr>
+            <a:normAutofit fontScale="92500" lnSpcReduction="20000"/>
+          </a:bodyPr>
           <a:lstStyle/>
           <a:p>
             <a:r>
               <a:rPr lang="en-US" dirty="0"/>
-              <a:t>After obtaining the above results, I checked which textures are misclassified and what the most common misclassification label is</a:t>
-            </a:r>
+              <a:t>Number of Layers = 1   15.7288</a:t>
+            </a:r>
+          </a:p>
+          <a:p>
+            <a:endParaRPr lang="en-US" dirty="0"/>
           </a:p>
           <a:p>
             <a:r>
               <a:rPr lang="en-US" dirty="0"/>
-              <a:t>The most common misclassifications were in textures 32, 33, and 39, shown next slide</a:t>
-            </a:r>
-          </a:p>
-          <a:p>
-            <a:pPr lvl="1"/>
+              <a:t>Number of Layers = 2   26.9322</a:t>
+            </a:r>
+          </a:p>
+          <a:p>
+            <a:endParaRPr lang="en-US" dirty="0"/>
+          </a:p>
+          <a:p>
             <a:r>
               <a:rPr lang="en-US" dirty="0"/>
-              <a:t>Texture 32 was classified as texture 34 a total of 37 times</a:t>
-            </a:r>
-          </a:p>
-          <a:p>
-            <a:pPr lvl="1"/>
+              <a:t>Number of Layers = 3   32.3559</a:t>
+            </a:r>
+          </a:p>
+          <a:p>
+            <a:endParaRPr lang="en-US" dirty="0"/>
+          </a:p>
+          <a:p>
             <a:r>
               <a:rPr lang="en-US" dirty="0"/>
-              <a:t>Texture 33 was classified as texture 32 a total of 41 times</a:t>
-            </a:r>
-          </a:p>
-          <a:p>
-            <a:pPr lvl="1"/>
+              <a:t>Number of Layers = 4   26.2542</a:t>
+            </a:r>
+          </a:p>
+          <a:p>
+            <a:endParaRPr lang="en-US" dirty="0"/>
+          </a:p>
+          <a:p>
             <a:r>
               <a:rPr lang="en-US" dirty="0"/>
-              <a:t>Texture 39 was classified as texture 40 a total of 36 times</a:t>
-            </a:r>
+              <a:t>Number of Layers = 5   17.4068</a:t>
+            </a:r>
+          </a:p>
+          <a:p>
+            <a:endParaRPr lang="en-US" dirty="0"/>
           </a:p>
           <a:p>
             <a:r>
               <a:rPr lang="en-US" dirty="0"/>
-              <a:t>As seen next slide, these textures are quite similar.</a:t>
+              <a:t>Best Laplacian PCC is 32.360000% accurate with 3 Layers</a:t>
             </a:r>
           </a:p>
         </p:txBody>
@@ -6574,7 +6594,7 @@
           <p:cNvPr id="4" name="Slide Number Placeholder 3">
             <a:extLst>
               <a:ext uri="{FF2B5EF4-FFF2-40B4-BE49-F238E27FC236}">
-                <a16:creationId xmlns:a16="http://schemas.microsoft.com/office/drawing/2014/main" id="{73F48D88-93B9-F5D3-3A6F-D8C4BC79530E}"/>
+                <a16:creationId xmlns:a16="http://schemas.microsoft.com/office/drawing/2014/main" id="{C0BF565F-E842-C37C-3FE0-F887D90695AC}"/>
               </a:ext>
             </a:extLst>
           </p:cNvPr>
@@ -6601,7 +6621,7 @@
     </p:spTree>
     <p:extLst>
       <p:ext uri="{BB962C8B-B14F-4D97-AF65-F5344CB8AC3E}">
-        <p14:creationId xmlns:p14="http://schemas.microsoft.com/office/powerpoint/2010/main" val="3350194071"/>
+        <p14:creationId xmlns:p14="http://schemas.microsoft.com/office/powerpoint/2010/main" val="1010374374"/>
       </p:ext>
     </p:extLst>
   </p:cSld>
@@ -6633,6 +6653,473 @@
           <p:cNvPr id="2" name="Title 1">
             <a:extLst>
               <a:ext uri="{FF2B5EF4-FFF2-40B4-BE49-F238E27FC236}">
+                <a16:creationId xmlns:a16="http://schemas.microsoft.com/office/drawing/2014/main" id="{F5212A34-2FCD-8ED9-70E7-1B09E675CF32}"/>
+              </a:ext>
+            </a:extLst>
+          </p:cNvPr>
+          <p:cNvSpPr>
+            <a:spLocks noGrp="1"/>
+          </p:cNvSpPr>
+          <p:nvPr>
+            <p:ph type="title"/>
+          </p:nvPr>
+        </p:nvSpPr>
+        <p:spPr/>
+        <p:txBody>
+          <a:bodyPr/>
+          <a:lstStyle/>
+          <a:p>
+            <a:r>
+              <a:rPr lang="en-US" dirty="0"/>
+              <a:t>Observations – Kurtosis all layers</a:t>
+            </a:r>
+          </a:p>
+        </p:txBody>
+      </p:sp>
+      <p:sp>
+        <p:nvSpPr>
+          <p:cNvPr id="3" name="Content Placeholder 2">
+            <a:extLst>
+              <a:ext uri="{FF2B5EF4-FFF2-40B4-BE49-F238E27FC236}">
+                <a16:creationId xmlns:a16="http://schemas.microsoft.com/office/drawing/2014/main" id="{15F0A204-B8E5-F70E-9B04-D59B3BB9824C}"/>
+              </a:ext>
+            </a:extLst>
+          </p:cNvPr>
+          <p:cNvSpPr>
+            <a:spLocks noGrp="1"/>
+          </p:cNvSpPr>
+          <p:nvPr>
+            <p:ph idx="1"/>
+          </p:nvPr>
+        </p:nvSpPr>
+        <p:spPr/>
+        <p:txBody>
+          <a:bodyPr>
+            <a:normAutofit fontScale="92500" lnSpcReduction="20000"/>
+          </a:bodyPr>
+          <a:lstStyle/>
+          <a:p>
+            <a:r>
+              <a:rPr lang="en-US" dirty="0"/>
+              <a:t>Number of Layers = 1   14.8305</a:t>
+            </a:r>
+          </a:p>
+          <a:p>
+            <a:endParaRPr lang="en-US" dirty="0"/>
+          </a:p>
+          <a:p>
+            <a:r>
+              <a:rPr lang="en-US" dirty="0"/>
+              <a:t>Number of Layers = 2   33.8305</a:t>
+            </a:r>
+          </a:p>
+          <a:p>
+            <a:endParaRPr lang="en-US" dirty="0"/>
+          </a:p>
+          <a:p>
+            <a:r>
+              <a:rPr lang="en-US" dirty="0"/>
+              <a:t>Number of Layers = 3   34.1695</a:t>
+            </a:r>
+          </a:p>
+          <a:p>
+            <a:endParaRPr lang="en-US" dirty="0"/>
+          </a:p>
+          <a:p>
+            <a:r>
+              <a:rPr lang="en-US" dirty="0"/>
+              <a:t>Number of Layers = 4   21.0339</a:t>
+            </a:r>
+          </a:p>
+          <a:p>
+            <a:endParaRPr lang="en-US" dirty="0"/>
+          </a:p>
+          <a:p>
+            <a:r>
+              <a:rPr lang="en-US" dirty="0"/>
+              <a:t>Number of Layers = 5   15.1525</a:t>
+            </a:r>
+          </a:p>
+          <a:p>
+            <a:endParaRPr lang="en-US" dirty="0"/>
+          </a:p>
+          <a:p>
+            <a:r>
+              <a:rPr lang="en-US" dirty="0"/>
+              <a:t>Best Laplacian PCC is 34.170000% accurate with 3 Layers</a:t>
+            </a:r>
+          </a:p>
+        </p:txBody>
+      </p:sp>
+      <p:sp>
+        <p:nvSpPr>
+          <p:cNvPr id="4" name="Slide Number Placeholder 3">
+            <a:extLst>
+              <a:ext uri="{FF2B5EF4-FFF2-40B4-BE49-F238E27FC236}">
+                <a16:creationId xmlns:a16="http://schemas.microsoft.com/office/drawing/2014/main" id="{8AD134FF-C139-1E4F-41C0-DACB8E5B52B8}"/>
+              </a:ext>
+            </a:extLst>
+          </p:cNvPr>
+          <p:cNvSpPr>
+            <a:spLocks noGrp="1"/>
+          </p:cNvSpPr>
+          <p:nvPr>
+            <p:ph type="sldNum" sz="quarter" idx="12"/>
+          </p:nvPr>
+        </p:nvSpPr>
+        <p:spPr/>
+        <p:txBody>
+          <a:bodyPr/>
+          <a:lstStyle/>
+          <a:p>
+            <a:fld id="{FAE858A7-4E67-4370-B4B5-094CAEAE4D8D}" type="slidenum">
+              <a:rPr lang="en-US" smtClean="0"/>
+              <a:t>12</a:t>
+            </a:fld>
+            <a:endParaRPr lang="en-US"/>
+          </a:p>
+        </p:txBody>
+      </p:sp>
+    </p:spTree>
+    <p:extLst>
+      <p:ext uri="{BB962C8B-B14F-4D97-AF65-F5344CB8AC3E}">
+        <p14:creationId xmlns:p14="http://schemas.microsoft.com/office/powerpoint/2010/main" val="2551005335"/>
+      </p:ext>
+    </p:extLst>
+  </p:cSld>
+  <p:clrMapOvr>
+    <a:masterClrMapping/>
+  </p:clrMapOvr>
+</p:sld>
+</file>
+
+<file path=ppt/slides/slide13.xml><?xml version="1.0" encoding="utf-8"?>
+<p:sld xmlns:a="http://schemas.openxmlformats.org/drawingml/2006/main" xmlns:r="http://schemas.openxmlformats.org/officeDocument/2006/relationships" xmlns:p="http://schemas.openxmlformats.org/presentationml/2006/main">
+  <p:cSld>
+    <p:spTree>
+      <p:nvGrpSpPr>
+        <p:cNvPr id="1" name=""/>
+        <p:cNvGrpSpPr/>
+        <p:nvPr/>
+      </p:nvGrpSpPr>
+      <p:grpSpPr>
+        <a:xfrm>
+          <a:off x="0" y="0"/>
+          <a:ext cx="0" cy="0"/>
+          <a:chOff x="0" y="0"/>
+          <a:chExt cx="0" cy="0"/>
+        </a:xfrm>
+      </p:grpSpPr>
+      <p:sp>
+        <p:nvSpPr>
+          <p:cNvPr id="2" name="Title 1">
+            <a:extLst>
+              <a:ext uri="{FF2B5EF4-FFF2-40B4-BE49-F238E27FC236}">
+                <a16:creationId xmlns:a16="http://schemas.microsoft.com/office/drawing/2014/main" id="{051CE146-45EF-9947-47C9-86FF29FDB35D}"/>
+              </a:ext>
+            </a:extLst>
+          </p:cNvPr>
+          <p:cNvSpPr>
+            <a:spLocks noGrp="1"/>
+          </p:cNvSpPr>
+          <p:nvPr>
+            <p:ph type="title"/>
+          </p:nvPr>
+        </p:nvSpPr>
+        <p:spPr/>
+        <p:txBody>
+          <a:bodyPr/>
+          <a:lstStyle/>
+          <a:p>
+            <a:r>
+              <a:rPr lang="en-US" dirty="0"/>
+              <a:t>Best Result Laplacian</a:t>
+            </a:r>
+          </a:p>
+        </p:txBody>
+      </p:sp>
+      <p:sp>
+        <p:nvSpPr>
+          <p:cNvPr id="3" name="Content Placeholder 2">
+            <a:extLst>
+              <a:ext uri="{FF2B5EF4-FFF2-40B4-BE49-F238E27FC236}">
+                <a16:creationId xmlns:a16="http://schemas.microsoft.com/office/drawing/2014/main" id="{D3D570C5-97DA-D245-0DBF-B43DAE650B50}"/>
+              </a:ext>
+            </a:extLst>
+          </p:cNvPr>
+          <p:cNvSpPr>
+            <a:spLocks noGrp="1"/>
+          </p:cNvSpPr>
+          <p:nvPr>
+            <p:ph idx="1"/>
+          </p:nvPr>
+        </p:nvSpPr>
+        <p:spPr/>
+        <p:txBody>
+          <a:bodyPr/>
+          <a:lstStyle/>
+          <a:p>
+            <a:r>
+              <a:rPr lang="en-US" dirty="0"/>
+              <a:t>Use 4 layers where </a:t>
+            </a:r>
+            <a:r>
+              <a:rPr lang="en-US" u="sng" dirty="0"/>
+              <a:t>layer 1 is the smallest and 4 is the largest</a:t>
+            </a:r>
+            <a:r>
+              <a:rPr lang="en-US" dirty="0"/>
+              <a:t>. The Laplacian pyramid toolbox outputs the layers in this format. After tuning, the following parameters were chosen.</a:t>
+            </a:r>
+          </a:p>
+          <a:p>
+            <a:pPr lvl="1"/>
+            <a:r>
+              <a:rPr lang="en-US" dirty="0"/>
+              <a:t>Mean of layer 1</a:t>
+            </a:r>
+          </a:p>
+          <a:p>
+            <a:pPr lvl="1"/>
+            <a:r>
+              <a:rPr lang="en-US" dirty="0"/>
+              <a:t>Variance of all layers</a:t>
+            </a:r>
+          </a:p>
+          <a:p>
+            <a:pPr lvl="1"/>
+            <a:r>
+              <a:rPr lang="en-US" dirty="0"/>
+              <a:t>Skew of layers 2 through 4</a:t>
+            </a:r>
+          </a:p>
+          <a:p>
+            <a:pPr lvl="1"/>
+            <a:r>
+              <a:rPr lang="en-US" dirty="0"/>
+              <a:t>Kurtosis of layers 2 through 4</a:t>
+            </a:r>
+          </a:p>
+          <a:p>
+            <a:r>
+              <a:rPr lang="en-US" dirty="0"/>
+              <a:t>PCC = 74.76%</a:t>
+            </a:r>
+          </a:p>
+        </p:txBody>
+      </p:sp>
+      <p:sp>
+        <p:nvSpPr>
+          <p:cNvPr id="4" name="Slide Number Placeholder 3">
+            <a:extLst>
+              <a:ext uri="{FF2B5EF4-FFF2-40B4-BE49-F238E27FC236}">
+                <a16:creationId xmlns:a16="http://schemas.microsoft.com/office/drawing/2014/main" id="{6F1A3A8E-FCEA-909B-B4F5-16DCBAC0DA8C}"/>
+              </a:ext>
+            </a:extLst>
+          </p:cNvPr>
+          <p:cNvSpPr>
+            <a:spLocks noGrp="1"/>
+          </p:cNvSpPr>
+          <p:nvPr>
+            <p:ph type="sldNum" sz="quarter" idx="12"/>
+          </p:nvPr>
+        </p:nvSpPr>
+        <p:spPr/>
+        <p:txBody>
+          <a:bodyPr/>
+          <a:lstStyle/>
+          <a:p>
+            <a:fld id="{FAE858A7-4E67-4370-B4B5-094CAEAE4D8D}" type="slidenum">
+              <a:rPr lang="en-US" smtClean="0"/>
+              <a:t>13</a:t>
+            </a:fld>
+            <a:endParaRPr lang="en-US" dirty="0"/>
+          </a:p>
+        </p:txBody>
+      </p:sp>
+    </p:spTree>
+    <p:extLst>
+      <p:ext uri="{BB962C8B-B14F-4D97-AF65-F5344CB8AC3E}">
+        <p14:creationId xmlns:p14="http://schemas.microsoft.com/office/powerpoint/2010/main" val="1671826336"/>
+      </p:ext>
+    </p:extLst>
+  </p:cSld>
+  <p:clrMapOvr>
+    <a:masterClrMapping/>
+  </p:clrMapOvr>
+</p:sld>
+</file>
+
+<file path=ppt/slides/slide14.xml><?xml version="1.0" encoding="utf-8"?>
+<p:sld xmlns:a="http://schemas.openxmlformats.org/drawingml/2006/main" xmlns:r="http://schemas.openxmlformats.org/officeDocument/2006/relationships" xmlns:p="http://schemas.openxmlformats.org/presentationml/2006/main">
+  <p:cSld>
+    <p:spTree>
+      <p:nvGrpSpPr>
+        <p:cNvPr id="1" name=""/>
+        <p:cNvGrpSpPr/>
+        <p:nvPr/>
+      </p:nvGrpSpPr>
+      <p:grpSpPr>
+        <a:xfrm>
+          <a:off x="0" y="0"/>
+          <a:ext cx="0" cy="0"/>
+          <a:chOff x="0" y="0"/>
+          <a:chExt cx="0" cy="0"/>
+        </a:xfrm>
+      </p:grpSpPr>
+      <p:sp>
+        <p:nvSpPr>
+          <p:cNvPr id="2" name="Title 1">
+            <a:extLst>
+              <a:ext uri="{FF2B5EF4-FFF2-40B4-BE49-F238E27FC236}">
+                <a16:creationId xmlns:a16="http://schemas.microsoft.com/office/drawing/2014/main" id="{277D30B6-8EC6-67D2-84E6-BCD2FDC884FB}"/>
+              </a:ext>
+            </a:extLst>
+          </p:cNvPr>
+          <p:cNvSpPr>
+            <a:spLocks noGrp="1"/>
+          </p:cNvSpPr>
+          <p:nvPr>
+            <p:ph type="title"/>
+          </p:nvPr>
+        </p:nvSpPr>
+        <p:spPr/>
+        <p:txBody>
+          <a:bodyPr/>
+          <a:lstStyle/>
+          <a:p>
+            <a:r>
+              <a:rPr lang="en-US" dirty="0"/>
+              <a:t>Mislabel Observations – Laplacian </a:t>
+            </a:r>
+          </a:p>
+        </p:txBody>
+      </p:sp>
+      <p:sp>
+        <p:nvSpPr>
+          <p:cNvPr id="3" name="Content Placeholder 2">
+            <a:extLst>
+              <a:ext uri="{FF2B5EF4-FFF2-40B4-BE49-F238E27FC236}">
+                <a16:creationId xmlns:a16="http://schemas.microsoft.com/office/drawing/2014/main" id="{83C88D35-7A94-EA99-97FC-BA8AE38FFEA8}"/>
+              </a:ext>
+            </a:extLst>
+          </p:cNvPr>
+          <p:cNvSpPr>
+            <a:spLocks noGrp="1"/>
+          </p:cNvSpPr>
+          <p:nvPr>
+            <p:ph idx="1"/>
+          </p:nvPr>
+        </p:nvSpPr>
+        <p:spPr/>
+        <p:txBody>
+          <a:bodyPr/>
+          <a:lstStyle/>
+          <a:p>
+            <a:r>
+              <a:rPr lang="en-US" dirty="0"/>
+              <a:t>After obtaining the results, I checked which textures are misclassified and what the most common misclassification label is for layer 4. </a:t>
+            </a:r>
+          </a:p>
+          <a:p>
+            <a:r>
+              <a:rPr lang="en-US" dirty="0"/>
+              <a:t>The most common misclassifications were in textures 32, 33, and 39, shown next slide</a:t>
+            </a:r>
+          </a:p>
+          <a:p>
+            <a:pPr lvl="1"/>
+            <a:r>
+              <a:rPr lang="en-US" dirty="0"/>
+              <a:t>Texture 32 was classified as texture 34 a total of 37 times</a:t>
+            </a:r>
+          </a:p>
+          <a:p>
+            <a:pPr lvl="1"/>
+            <a:r>
+              <a:rPr lang="en-US" dirty="0"/>
+              <a:t>Texture 33 was classified as texture 32 a total of 41 times</a:t>
+            </a:r>
+          </a:p>
+          <a:p>
+            <a:pPr lvl="1"/>
+            <a:r>
+              <a:rPr lang="en-US" dirty="0"/>
+              <a:t>Texture 39 was classified as texture 40 a total of 36 times</a:t>
+            </a:r>
+          </a:p>
+          <a:p>
+            <a:r>
+              <a:rPr lang="en-US" dirty="0"/>
+              <a:t>As seen next slide, these textures are quite similar.</a:t>
+            </a:r>
+          </a:p>
+        </p:txBody>
+      </p:sp>
+      <p:sp>
+        <p:nvSpPr>
+          <p:cNvPr id="4" name="Slide Number Placeholder 3">
+            <a:extLst>
+              <a:ext uri="{FF2B5EF4-FFF2-40B4-BE49-F238E27FC236}">
+                <a16:creationId xmlns:a16="http://schemas.microsoft.com/office/drawing/2014/main" id="{73F48D88-93B9-F5D3-3A6F-D8C4BC79530E}"/>
+              </a:ext>
+            </a:extLst>
+          </p:cNvPr>
+          <p:cNvSpPr>
+            <a:spLocks noGrp="1"/>
+          </p:cNvSpPr>
+          <p:nvPr>
+            <p:ph type="sldNum" sz="quarter" idx="12"/>
+          </p:nvPr>
+        </p:nvSpPr>
+        <p:spPr/>
+        <p:txBody>
+          <a:bodyPr/>
+          <a:lstStyle/>
+          <a:p>
+            <a:fld id="{FAE858A7-4E67-4370-B4B5-094CAEAE4D8D}" type="slidenum">
+              <a:rPr lang="en-US" smtClean="0"/>
+              <a:t>14</a:t>
+            </a:fld>
+            <a:endParaRPr lang="en-US"/>
+          </a:p>
+        </p:txBody>
+      </p:sp>
+    </p:spTree>
+    <p:extLst>
+      <p:ext uri="{BB962C8B-B14F-4D97-AF65-F5344CB8AC3E}">
+        <p14:creationId xmlns:p14="http://schemas.microsoft.com/office/powerpoint/2010/main" val="3350194071"/>
+      </p:ext>
+    </p:extLst>
+  </p:cSld>
+  <p:clrMapOvr>
+    <a:masterClrMapping/>
+  </p:clrMapOvr>
+</p:sld>
+</file>
+
+<file path=ppt/slides/slide15.xml><?xml version="1.0" encoding="utf-8"?>
+<p:sld xmlns:a="http://schemas.openxmlformats.org/drawingml/2006/main" xmlns:r="http://schemas.openxmlformats.org/officeDocument/2006/relationships" xmlns:p="http://schemas.openxmlformats.org/presentationml/2006/main">
+  <p:cSld>
+    <p:spTree>
+      <p:nvGrpSpPr>
+        <p:cNvPr id="1" name=""/>
+        <p:cNvGrpSpPr/>
+        <p:nvPr/>
+      </p:nvGrpSpPr>
+      <p:grpSpPr>
+        <a:xfrm>
+          <a:off x="0" y="0"/>
+          <a:ext cx="0" cy="0"/>
+          <a:chOff x="0" y="0"/>
+          <a:chExt cx="0" cy="0"/>
+        </a:xfrm>
+      </p:grpSpPr>
+      <p:sp>
+        <p:nvSpPr>
+          <p:cNvPr id="2" name="Title 1">
+            <a:extLst>
+              <a:ext uri="{FF2B5EF4-FFF2-40B4-BE49-F238E27FC236}">
                 <a16:creationId xmlns:a16="http://schemas.microsoft.com/office/drawing/2014/main" id="{93F9E874-C9C9-99A2-AEC5-D756BFF745EA}"/>
               </a:ext>
             </a:extLst>
@@ -6684,7 +7171,7 @@
           <a:p>
             <a:fld id="{FAE858A7-4E67-4370-B4B5-094CAEAE4D8D}" type="slidenum">
               <a:rPr lang="en-US" smtClean="0"/>
-              <a:t>12</a:t>
+              <a:t>15</a:t>
             </a:fld>
             <a:endParaRPr lang="en-US" dirty="0"/>
           </a:p>
@@ -6834,6 +7321,9 @@
                     <a:lumOff val="40000"/>
                   </a:schemeClr>
                 </a:solidFill>
+                <a:highlight>
+                  <a:srgbClr val="808080"/>
+                </a:highlight>
               </a:rPr>
               <a:t>32</a:t>
             </a:r>
@@ -6876,6 +7366,9 @@
                     <a:lumOff val="40000"/>
                   </a:schemeClr>
                 </a:solidFill>
+                <a:highlight>
+                  <a:srgbClr val="808080"/>
+                </a:highlight>
               </a:rPr>
               <a:t>33</a:t>
             </a:r>
@@ -6918,6 +7411,9 @@
                     <a:lumOff val="40000"/>
                   </a:schemeClr>
                 </a:solidFill>
+                <a:highlight>
+                  <a:srgbClr val="808080"/>
+                </a:highlight>
               </a:rPr>
               <a:t>39</a:t>
             </a:r>
@@ -6996,6 +7492,9 @@
                     <a:lumOff val="40000"/>
                   </a:schemeClr>
                 </a:solidFill>
+                <a:highlight>
+                  <a:srgbClr val="808080"/>
+                </a:highlight>
               </a:rPr>
               <a:t>32</a:t>
             </a:r>
@@ -7088,7 +7587,7 @@
         </p:nvSpPr>
         <p:spPr>
           <a:xfrm>
-            <a:off x="2619455" y="5879068"/>
+            <a:off x="2619455" y="5837697"/>
             <a:ext cx="492790" cy="369332"/>
           </a:xfrm>
           <a:prstGeom prst="rect">
@@ -7110,6 +7609,9 @@
                     <a:lumOff val="40000"/>
                   </a:schemeClr>
                 </a:solidFill>
+                <a:highlight>
+                  <a:srgbClr val="808080"/>
+                </a:highlight>
               </a:rPr>
               <a:t>34</a:t>
             </a:r>
@@ -7152,6 +7654,9 @@
                     <a:lumOff val="40000"/>
                   </a:schemeClr>
                 </a:solidFill>
+                <a:highlight>
+                  <a:srgbClr val="808080"/>
+                </a:highlight>
               </a:rPr>
               <a:t>40</a:t>
             </a:r>
@@ -7300,7 +7805,7 @@
 </p:sld>
 </file>
 
-<file path=ppt/slides/slide13.xml><?xml version="1.0" encoding="utf-8"?>
+<file path=ppt/slides/slide16.xml><?xml version="1.0" encoding="utf-8"?>
 <p:sld xmlns:a="http://schemas.openxmlformats.org/drawingml/2006/main" xmlns:r="http://schemas.openxmlformats.org/officeDocument/2006/relationships" xmlns:p="http://schemas.openxmlformats.org/presentationml/2006/main">
   <p:cSld>
     <p:spTree>
@@ -7366,7 +7871,41 @@
           <a:bodyPr/>
           <a:lstStyle/>
           <a:p>
-            <a:endParaRPr lang="en-US"/>
+            <a:r>
+              <a:rPr lang="en-US" dirty="0"/>
+              <a:t>Similar to the Laplacian, all statistics were initially used, resulting in great performance. At 4 scales and 4 orientations, the filter produced an accuracy of 85.27%.</a:t>
+            </a:r>
+          </a:p>
+          <a:p>
+            <a:pPr lvl="1"/>
+            <a:r>
+              <a:rPr lang="en-US" dirty="0"/>
+              <a:t>The file “Gabor all stats all layers.txt” contains the output for each scale/orient</a:t>
+            </a:r>
+          </a:p>
+          <a:p>
+            <a:r>
+              <a:rPr lang="en-US" dirty="0"/>
+              <a:t>Testing mean only, the best PCC = 88.86% with 5 scales and 6 orientations</a:t>
+            </a:r>
+          </a:p>
+          <a:p>
+            <a:r>
+              <a:rPr lang="en-US" dirty="0"/>
+              <a:t>Testing variance only, best PCC = 79.39% with 4 scales and 4 orientations</a:t>
+            </a:r>
+          </a:p>
+          <a:p>
+            <a:r>
+              <a:rPr lang="en-US" dirty="0"/>
+              <a:t>Testing skewness only, best PCC = 59.78% accurate with 3 scales and 4 orientations</a:t>
+            </a:r>
+          </a:p>
+          <a:p>
+            <a:r>
+              <a:rPr lang="en-US" dirty="0"/>
+              <a:t>Testing kurtosis only, best PCC = 1.69% accurate at all scale and orientations</a:t>
+            </a:r>
           </a:p>
         </p:txBody>
       </p:sp>
@@ -7393,7 +7932,7 @@
           <a:p>
             <a:fld id="{FAE858A7-4E67-4370-B4B5-094CAEAE4D8D}" type="slidenum">
               <a:rPr lang="en-US" smtClean="0"/>
-              <a:t>13</a:t>
+              <a:t>16</a:t>
             </a:fld>
             <a:endParaRPr lang="en-US"/>
           </a:p>
@@ -7412,7 +7951,7 @@
 </p:sld>
 </file>
 
-<file path=ppt/slides/slide14.xml><?xml version="1.0" encoding="utf-8"?>
+<file path=ppt/slides/slide17.xml><?xml version="1.0" encoding="utf-8"?>
 <p:sld xmlns:a="http://schemas.openxmlformats.org/drawingml/2006/main" xmlns:r="http://schemas.openxmlformats.org/officeDocument/2006/relationships" xmlns:p="http://schemas.openxmlformats.org/presentationml/2006/main">
   <p:cSld>
     <p:spTree>
@@ -7434,7 +7973,7 @@
           <p:cNvPr id="2" name="Title 1">
             <a:extLst>
               <a:ext uri="{FF2B5EF4-FFF2-40B4-BE49-F238E27FC236}">
-                <a16:creationId xmlns:a16="http://schemas.microsoft.com/office/drawing/2014/main" id="{0978BC7C-0632-C147-305A-60B340730BF9}"/>
+                <a16:creationId xmlns:a16="http://schemas.microsoft.com/office/drawing/2014/main" id="{4F85D684-2C0E-93CB-2B90-BF6205E4C7C8}"/>
               </a:ext>
             </a:extLst>
           </p:cNvPr>
@@ -7452,7 +7991,7 @@
           <a:p>
             <a:r>
               <a:rPr lang="en-US" dirty="0"/>
-              <a:t>Discussion and Conclusion</a:t>
+              <a:t>Gabor</a:t>
             </a:r>
           </a:p>
         </p:txBody>
@@ -7462,7 +8001,7 @@
           <p:cNvPr id="3" name="Content Placeholder 2">
             <a:extLst>
               <a:ext uri="{FF2B5EF4-FFF2-40B4-BE49-F238E27FC236}">
-                <a16:creationId xmlns:a16="http://schemas.microsoft.com/office/drawing/2014/main" id="{66552094-2F2A-1B32-4380-C417359657E2}"/>
+                <a16:creationId xmlns:a16="http://schemas.microsoft.com/office/drawing/2014/main" id="{90EA86DA-7DAB-6F64-D89F-2BA9B05DCA40}"/>
               </a:ext>
             </a:extLst>
           </p:cNvPr>
@@ -7480,34 +8019,36 @@
           <a:p>
             <a:r>
               <a:rPr lang="en-US" dirty="0"/>
-              <a:t>The matched filtering looks better to me than the Canny and the </a:t>
-            </a:r>
-            <a:r>
-              <a:rPr lang="en-US" dirty="0" err="1"/>
-              <a:t>LoG</a:t>
-            </a:r>
+              <a:t>Removing kurtosis due to its poor performance, the best Gabor PCC = 89.1% accurate with 4 scales and 4 orientations. </a:t>
+            </a:r>
+          </a:p>
+          <a:p>
             <a:r>
               <a:rPr lang="en-US" dirty="0"/>
-              <a:t>, but maybe I’m biased because I made it and I’m proud of it. </a:t>
-            </a:r>
-          </a:p>
-          <a:p>
+              <a:t>Removing Skewness as well resulted in the best Gabor PCC = 90.25% accurate with 4 scales and 4 orientations. </a:t>
+            </a:r>
+          </a:p>
+          <a:p>
+            <a:pPr lvl="1"/>
             <a:r>
               <a:rPr lang="en-US" dirty="0"/>
-              <a:t>I tried to optimize the threshold of the Canny filtering on both retina 1 and retina 2, but it only helped a little. Length filtering was more effective than manually changing the thresholding. </a:t>
-            </a:r>
-          </a:p>
-          <a:p>
-            <a:endParaRPr lang="en-US" dirty="0"/>
-          </a:p>
-        </p:txBody>
-      </p:sp>
-      <p:sp>
-        <p:nvSpPr>
-          <p:cNvPr id="5" name="Slide Number Placeholder 4">
+              <a:t>I tried adding in kurtosis again and re-ran the test. It had no effect on the results.</a:t>
+            </a:r>
+          </a:p>
+          <a:p>
+            <a:r>
+              <a:rPr lang="en-US" dirty="0"/>
+              <a:t>It appears that mean and variance are the most important statistics with 4 scales and 4 orientations being the optimal choice. </a:t>
+            </a:r>
+          </a:p>
+        </p:txBody>
+      </p:sp>
+      <p:sp>
+        <p:nvSpPr>
+          <p:cNvPr id="4" name="Slide Number Placeholder 3">
             <a:extLst>
               <a:ext uri="{FF2B5EF4-FFF2-40B4-BE49-F238E27FC236}">
-                <a16:creationId xmlns:a16="http://schemas.microsoft.com/office/drawing/2014/main" id="{C395C6EC-FE0F-0BC0-D4C5-51E09090E166}"/>
+                <a16:creationId xmlns:a16="http://schemas.microsoft.com/office/drawing/2014/main" id="{7CD7A942-86F6-90FE-5FA2-A93E9B31F292}"/>
               </a:ext>
             </a:extLst>
           </p:cNvPr>
@@ -7525,7 +8066,7 @@
           <a:p>
             <a:fld id="{FAE858A7-4E67-4370-B4B5-094CAEAE4D8D}" type="slidenum">
               <a:rPr lang="en-US" smtClean="0"/>
-              <a:t>14</a:t>
+              <a:t>17</a:t>
             </a:fld>
             <a:endParaRPr lang="en-US"/>
           </a:p>
@@ -7534,7 +8075,7 @@
     </p:spTree>
     <p:extLst>
       <p:ext uri="{BB962C8B-B14F-4D97-AF65-F5344CB8AC3E}">
-        <p14:creationId xmlns:p14="http://schemas.microsoft.com/office/powerpoint/2010/main" val="1321214935"/>
+        <p14:creationId xmlns:p14="http://schemas.microsoft.com/office/powerpoint/2010/main" val="2301513490"/>
       </p:ext>
     </p:extLst>
   </p:cSld>
@@ -7544,7 +8085,7 @@
 </p:sld>
 </file>
 
-<file path=ppt/slides/slide15.xml><?xml version="1.0" encoding="utf-8"?>
+<file path=ppt/slides/slide18.xml><?xml version="1.0" encoding="utf-8"?>
 <p:sld xmlns:a="http://schemas.openxmlformats.org/drawingml/2006/main" xmlns:r="http://schemas.openxmlformats.org/officeDocument/2006/relationships" xmlns:p="http://schemas.openxmlformats.org/presentationml/2006/main">
   <p:cSld>
     <p:spTree>
@@ -7566,7 +8107,7 @@
           <p:cNvPr id="2" name="Title 1">
             <a:extLst>
               <a:ext uri="{FF2B5EF4-FFF2-40B4-BE49-F238E27FC236}">
-                <a16:creationId xmlns:a16="http://schemas.microsoft.com/office/drawing/2014/main" id="{FF250D53-AC24-E1CC-A1C3-DE2218262E62}"/>
+                <a16:creationId xmlns:a16="http://schemas.microsoft.com/office/drawing/2014/main" id="{D53895DE-DAEF-45D1-544F-519CB140C76A}"/>
               </a:ext>
             </a:extLst>
           </p:cNvPr>
@@ -7584,8 +8125,74 @@
           <a:p>
             <a:r>
               <a:rPr lang="en-US" dirty="0"/>
-              <a:t>Appendix – Code – Main file</a:t>
-            </a:r>
+              <a:t>Mislabel Observations – Gabor </a:t>
+            </a:r>
+          </a:p>
+        </p:txBody>
+      </p:sp>
+      <p:sp>
+        <p:nvSpPr>
+          <p:cNvPr id="3" name="Content Placeholder 2">
+            <a:extLst>
+              <a:ext uri="{FF2B5EF4-FFF2-40B4-BE49-F238E27FC236}">
+                <a16:creationId xmlns:a16="http://schemas.microsoft.com/office/drawing/2014/main" id="{002C1F13-D67B-961A-778D-F4D4D23495ED}"/>
+              </a:ext>
+            </a:extLst>
+          </p:cNvPr>
+          <p:cNvSpPr>
+            <a:spLocks noGrp="1"/>
+          </p:cNvSpPr>
+          <p:nvPr>
+            <p:ph idx="1"/>
+          </p:nvPr>
+        </p:nvSpPr>
+        <p:spPr/>
+        <p:txBody>
+          <a:bodyPr/>
+          <a:lstStyle/>
+          <a:p>
+            <a:r>
+              <a:rPr lang="en-US" dirty="0"/>
+              <a:t>As with the Laplacian, I modified the code to only run at 4 scales and 4 orientations, then checked for mislabeled textures.</a:t>
+            </a:r>
+          </a:p>
+          <a:p>
+            <a:pPr lvl="1"/>
+            <a:r>
+              <a:rPr lang="en-US" dirty="0"/>
+              <a:t>Texture 10 was misclassified to texture 11 a total of 55 times, the most by far. </a:t>
+            </a:r>
+          </a:p>
+          <a:p>
+            <a:pPr lvl="1"/>
+            <a:r>
+              <a:rPr lang="en-US" dirty="0"/>
+              <a:t>Texture 13 was misclassified to texture 12 a total of 39 times</a:t>
+            </a:r>
+          </a:p>
+          <a:p>
+            <a:pPr lvl="1"/>
+            <a:r>
+              <a:rPr lang="en-US" dirty="0"/>
+              <a:t>Texture 15 was misclassified to texture 14 a total of 26 times</a:t>
+            </a:r>
+          </a:p>
+          <a:p>
+            <a:r>
+              <a:rPr lang="en-US" dirty="0"/>
+              <a:t>As seen next slide, these textures are quite similar in structure. 10 and 11 and 13 and 12 are very structurally similar but inverted from each other.</a:t>
+            </a:r>
+          </a:p>
+          <a:p>
+            <a:pPr lvl="1"/>
+            <a:r>
+              <a:rPr lang="en-US" dirty="0"/>
+              <a:t>However, I’m not sure I could tell 15 and 14 apart unless they were side-by-side as shown.</a:t>
+            </a:r>
+          </a:p>
+          <a:p>
+            <a:pPr lvl="1"/>
+            <a:endParaRPr lang="en-US" dirty="0"/>
           </a:p>
         </p:txBody>
       </p:sp>
@@ -7594,7 +8201,7 @@
           <p:cNvPr id="4" name="Slide Number Placeholder 3">
             <a:extLst>
               <a:ext uri="{FF2B5EF4-FFF2-40B4-BE49-F238E27FC236}">
-                <a16:creationId xmlns:a16="http://schemas.microsoft.com/office/drawing/2014/main" id="{4BEAEDAB-60F8-9CDF-1300-8B3401975142}"/>
+                <a16:creationId xmlns:a16="http://schemas.microsoft.com/office/drawing/2014/main" id="{FD229CA6-0D4F-D06C-08A8-043D257ABBC0}"/>
               </a:ext>
             </a:extLst>
           </p:cNvPr>
@@ -7612,7 +8219,7 @@
           <a:p>
             <a:fld id="{FAE858A7-4E67-4370-B4B5-094CAEAE4D8D}" type="slidenum">
               <a:rPr lang="en-US" smtClean="0"/>
-              <a:t>15</a:t>
+              <a:t>18</a:t>
             </a:fld>
             <a:endParaRPr lang="en-US"/>
           </a:p>
@@ -7621,7 +8228,707 @@
     </p:spTree>
     <p:extLst>
       <p:ext uri="{BB962C8B-B14F-4D97-AF65-F5344CB8AC3E}">
-        <p14:creationId xmlns:p14="http://schemas.microsoft.com/office/powerpoint/2010/main" val="2220207043"/>
+        <p14:creationId xmlns:p14="http://schemas.microsoft.com/office/powerpoint/2010/main" val="2356872282"/>
+      </p:ext>
+    </p:extLst>
+  </p:cSld>
+  <p:clrMapOvr>
+    <a:masterClrMapping/>
+  </p:clrMapOvr>
+</p:sld>
+</file>
+
+<file path=ppt/slides/slide19.xml><?xml version="1.0" encoding="utf-8"?>
+<p:sld xmlns:a="http://schemas.openxmlformats.org/drawingml/2006/main" xmlns:r="http://schemas.openxmlformats.org/officeDocument/2006/relationships" xmlns:p="http://schemas.openxmlformats.org/presentationml/2006/main">
+  <p:cSld>
+    <p:spTree>
+      <p:nvGrpSpPr>
+        <p:cNvPr id="1" name=""/>
+        <p:cNvGrpSpPr/>
+        <p:nvPr/>
+      </p:nvGrpSpPr>
+      <p:grpSpPr>
+        <a:xfrm>
+          <a:off x="0" y="0"/>
+          <a:ext cx="0" cy="0"/>
+          <a:chOff x="0" y="0"/>
+          <a:chExt cx="0" cy="0"/>
+        </a:xfrm>
+      </p:grpSpPr>
+      <p:pic>
+        <p:nvPicPr>
+          <p:cNvPr id="24" name="Picture 23" descr="A close-up of a black and white texture&#10;&#10;Description automatically generated">
+            <a:extLst>
+              <a:ext uri="{FF2B5EF4-FFF2-40B4-BE49-F238E27FC236}">
+                <a16:creationId xmlns:a16="http://schemas.microsoft.com/office/drawing/2014/main" id="{2CB6534C-937E-3725-22DD-BB4098269418}"/>
+              </a:ext>
+            </a:extLst>
+          </p:cNvPr>
+          <p:cNvPicPr>
+            <a:picLocks noChangeAspect="1"/>
+          </p:cNvPicPr>
+          <p:nvPr/>
+        </p:nvPicPr>
+        <p:blipFill>
+          <a:blip r:embed="rId2">
+            <a:extLst>
+              <a:ext uri="{28A0092B-C50C-407E-A947-70E740481C1C}">
+                <a14:useLocalDpi xmlns:a14="http://schemas.microsoft.com/office/drawing/2010/main" val="0"/>
+              </a:ext>
+            </a:extLst>
+          </a:blip>
+          <a:stretch>
+            <a:fillRect/>
+          </a:stretch>
+        </p:blipFill>
+        <p:spPr>
+          <a:xfrm>
+            <a:off x="6986509" y="3948118"/>
+            <a:ext cx="2093243" cy="2093243"/>
+          </a:xfrm>
+          <a:prstGeom prst="rect">
+            <a:avLst/>
+          </a:prstGeom>
+        </p:spPr>
+      </p:pic>
+      <p:pic>
+        <p:nvPicPr>
+          <p:cNvPr id="22" name="Picture 21" descr="A close-up of a black and white grid&#10;&#10;Description automatically generated">
+            <a:extLst>
+              <a:ext uri="{FF2B5EF4-FFF2-40B4-BE49-F238E27FC236}">
+                <a16:creationId xmlns:a16="http://schemas.microsoft.com/office/drawing/2014/main" id="{B26ACB74-0773-99B6-722D-917BE969BDC9}"/>
+              </a:ext>
+            </a:extLst>
+          </p:cNvPr>
+          <p:cNvPicPr>
+            <a:picLocks noChangeAspect="1"/>
+          </p:cNvPicPr>
+          <p:nvPr/>
+        </p:nvPicPr>
+        <p:blipFill>
+          <a:blip r:embed="rId3">
+            <a:extLst>
+              <a:ext uri="{28A0092B-C50C-407E-A947-70E740481C1C}">
+                <a14:useLocalDpi xmlns:a14="http://schemas.microsoft.com/office/drawing/2010/main" val="0"/>
+              </a:ext>
+            </a:extLst>
+          </a:blip>
+          <a:stretch>
+            <a:fillRect/>
+          </a:stretch>
+        </p:blipFill>
+        <p:spPr>
+          <a:xfrm>
+            <a:off x="4002756" y="3948118"/>
+            <a:ext cx="2093243" cy="2093243"/>
+          </a:xfrm>
+          <a:prstGeom prst="rect">
+            <a:avLst/>
+          </a:prstGeom>
+        </p:spPr>
+      </p:pic>
+      <p:pic>
+        <p:nvPicPr>
+          <p:cNvPr id="20" name="Picture 19" descr="A black and white polka dot fabric&#10;&#10;Description automatically generated">
+            <a:extLst>
+              <a:ext uri="{FF2B5EF4-FFF2-40B4-BE49-F238E27FC236}">
+                <a16:creationId xmlns:a16="http://schemas.microsoft.com/office/drawing/2014/main" id="{66C9412B-FBF3-3E66-95C3-B6926B40F779}"/>
+              </a:ext>
+            </a:extLst>
+          </p:cNvPr>
+          <p:cNvPicPr>
+            <a:picLocks noChangeAspect="1"/>
+          </p:cNvPicPr>
+          <p:nvPr/>
+        </p:nvPicPr>
+        <p:blipFill>
+          <a:blip r:embed="rId4">
+            <a:extLst>
+              <a:ext uri="{28A0092B-C50C-407E-A947-70E740481C1C}">
+                <a14:useLocalDpi xmlns:a14="http://schemas.microsoft.com/office/drawing/2010/main" val="0"/>
+              </a:ext>
+            </a:extLst>
+          </a:blip>
+          <a:stretch>
+            <a:fillRect/>
+          </a:stretch>
+        </p:blipFill>
+        <p:spPr>
+          <a:xfrm>
+            <a:off x="1019003" y="3946015"/>
+            <a:ext cx="2093243" cy="2093243"/>
+          </a:xfrm>
+          <a:prstGeom prst="rect">
+            <a:avLst/>
+          </a:prstGeom>
+        </p:spPr>
+      </p:pic>
+      <p:pic>
+        <p:nvPicPr>
+          <p:cNvPr id="14" name="Picture 13" descr="A close-up of a black and white texture&#10;&#10;Description automatically generated">
+            <a:extLst>
+              <a:ext uri="{FF2B5EF4-FFF2-40B4-BE49-F238E27FC236}">
+                <a16:creationId xmlns:a16="http://schemas.microsoft.com/office/drawing/2014/main" id="{72D0FE4F-0625-9CDE-7BAC-3B707F606A9C}"/>
+              </a:ext>
+            </a:extLst>
+          </p:cNvPr>
+          <p:cNvPicPr>
+            <a:picLocks noChangeAspect="1"/>
+          </p:cNvPicPr>
+          <p:nvPr/>
+        </p:nvPicPr>
+        <p:blipFill>
+          <a:blip r:embed="rId5">
+            <a:extLst>
+              <a:ext uri="{28A0092B-C50C-407E-A947-70E740481C1C}">
+                <a14:useLocalDpi xmlns:a14="http://schemas.microsoft.com/office/drawing/2010/main" val="0"/>
+              </a:ext>
+            </a:extLst>
+          </a:blip>
+          <a:stretch>
+            <a:fillRect/>
+          </a:stretch>
+        </p:blipFill>
+        <p:spPr>
+          <a:xfrm>
+            <a:off x="6986509" y="1471735"/>
+            <a:ext cx="2093244" cy="2093244"/>
+          </a:xfrm>
+          <a:prstGeom prst="rect">
+            <a:avLst/>
+          </a:prstGeom>
+        </p:spPr>
+      </p:pic>
+      <p:pic>
+        <p:nvPicPr>
+          <p:cNvPr id="8" name="Picture 7" descr="A close up of a white fabric&#10;&#10;Description automatically generated">
+            <a:extLst>
+              <a:ext uri="{FF2B5EF4-FFF2-40B4-BE49-F238E27FC236}">
+                <a16:creationId xmlns:a16="http://schemas.microsoft.com/office/drawing/2014/main" id="{F281A3A1-F639-9AEA-21FB-83604809AE93}"/>
+              </a:ext>
+            </a:extLst>
+          </p:cNvPr>
+          <p:cNvPicPr>
+            <a:picLocks noChangeAspect="1"/>
+          </p:cNvPicPr>
+          <p:nvPr/>
+        </p:nvPicPr>
+        <p:blipFill>
+          <a:blip r:embed="rId6">
+            <a:extLst>
+              <a:ext uri="{28A0092B-C50C-407E-A947-70E740481C1C}">
+                <a14:useLocalDpi xmlns:a14="http://schemas.microsoft.com/office/drawing/2010/main" val="0"/>
+              </a:ext>
+            </a:extLst>
+          </a:blip>
+          <a:stretch>
+            <a:fillRect/>
+          </a:stretch>
+        </p:blipFill>
+        <p:spPr>
+          <a:xfrm>
+            <a:off x="1019003" y="1471735"/>
+            <a:ext cx="2093244" cy="2093244"/>
+          </a:xfrm>
+          <a:prstGeom prst="rect">
+            <a:avLst/>
+          </a:prstGeom>
+        </p:spPr>
+      </p:pic>
+      <p:sp>
+        <p:nvSpPr>
+          <p:cNvPr id="2" name="Title 1">
+            <a:extLst>
+              <a:ext uri="{FF2B5EF4-FFF2-40B4-BE49-F238E27FC236}">
+                <a16:creationId xmlns:a16="http://schemas.microsoft.com/office/drawing/2014/main" id="{407A3C33-6006-FBFB-C4DD-73ADB62AD10D}"/>
+              </a:ext>
+            </a:extLst>
+          </p:cNvPr>
+          <p:cNvSpPr>
+            <a:spLocks noGrp="1"/>
+          </p:cNvSpPr>
+          <p:nvPr>
+            <p:ph type="title"/>
+          </p:nvPr>
+        </p:nvSpPr>
+        <p:spPr/>
+        <p:txBody>
+          <a:bodyPr/>
+          <a:lstStyle/>
+          <a:p>
+            <a:r>
+              <a:rPr lang="en-US" dirty="0"/>
+              <a:t>Mislabel Observations – Gabor </a:t>
+            </a:r>
+          </a:p>
+        </p:txBody>
+      </p:sp>
+      <p:sp>
+        <p:nvSpPr>
+          <p:cNvPr id="4" name="Slide Number Placeholder 3">
+            <a:extLst>
+              <a:ext uri="{FF2B5EF4-FFF2-40B4-BE49-F238E27FC236}">
+                <a16:creationId xmlns:a16="http://schemas.microsoft.com/office/drawing/2014/main" id="{45ACA4E7-A587-672D-B91C-32F60D15BA6F}"/>
+              </a:ext>
+            </a:extLst>
+          </p:cNvPr>
+          <p:cNvSpPr>
+            <a:spLocks noGrp="1"/>
+          </p:cNvSpPr>
+          <p:nvPr>
+            <p:ph type="sldNum" sz="quarter" idx="12"/>
+          </p:nvPr>
+        </p:nvSpPr>
+        <p:spPr/>
+        <p:txBody>
+          <a:bodyPr/>
+          <a:lstStyle/>
+          <a:p>
+            <a:fld id="{FAE858A7-4E67-4370-B4B5-094CAEAE4D8D}" type="slidenum">
+              <a:rPr lang="en-US" smtClean="0"/>
+              <a:t>19</a:t>
+            </a:fld>
+            <a:endParaRPr lang="en-US"/>
+          </a:p>
+        </p:txBody>
+      </p:sp>
+      <p:sp>
+        <p:nvSpPr>
+          <p:cNvPr id="5" name="TextBox 4">
+            <a:extLst>
+              <a:ext uri="{FF2B5EF4-FFF2-40B4-BE49-F238E27FC236}">
+                <a16:creationId xmlns:a16="http://schemas.microsoft.com/office/drawing/2014/main" id="{A02C9C54-CC23-5227-E56D-9BB2B00BB2E4}"/>
+              </a:ext>
+            </a:extLst>
+          </p:cNvPr>
+          <p:cNvSpPr txBox="1"/>
+          <p:nvPr/>
+        </p:nvSpPr>
+        <p:spPr>
+          <a:xfrm>
+            <a:off x="8586963" y="3195647"/>
+            <a:ext cx="492790" cy="369332"/>
+          </a:xfrm>
+          <a:prstGeom prst="rect">
+            <a:avLst/>
+          </a:prstGeom>
+          <a:noFill/>
+        </p:spPr>
+        <p:txBody>
+          <a:bodyPr wrap="square" rtlCol="0">
+            <a:spAutoFit/>
+          </a:bodyPr>
+          <a:lstStyle/>
+          <a:p>
+            <a:r>
+              <a:rPr lang="en-US" dirty="0">
+                <a:solidFill>
+                  <a:schemeClr val="accent3">
+                    <a:lumMod val="60000"/>
+                    <a:lumOff val="40000"/>
+                  </a:schemeClr>
+                </a:solidFill>
+                <a:highlight>
+                  <a:srgbClr val="808080"/>
+                </a:highlight>
+              </a:rPr>
+              <a:t>15</a:t>
+            </a:r>
+          </a:p>
+        </p:txBody>
+      </p:sp>
+      <p:sp>
+        <p:nvSpPr>
+          <p:cNvPr id="6" name="TextBox 5">
+            <a:extLst>
+              <a:ext uri="{FF2B5EF4-FFF2-40B4-BE49-F238E27FC236}">
+                <a16:creationId xmlns:a16="http://schemas.microsoft.com/office/drawing/2014/main" id="{0D9B3B53-3D22-3755-0B8E-B399D6D904F5}"/>
+              </a:ext>
+            </a:extLst>
+          </p:cNvPr>
+          <p:cNvSpPr txBox="1"/>
+          <p:nvPr/>
+        </p:nvSpPr>
+        <p:spPr>
+          <a:xfrm>
+            <a:off x="2619457" y="3195647"/>
+            <a:ext cx="492790" cy="369332"/>
+          </a:xfrm>
+          <a:prstGeom prst="rect">
+            <a:avLst/>
+          </a:prstGeom>
+          <a:noFill/>
+        </p:spPr>
+        <p:txBody>
+          <a:bodyPr wrap="square" rtlCol="0">
+            <a:spAutoFit/>
+          </a:bodyPr>
+          <a:lstStyle/>
+          <a:p>
+            <a:r>
+              <a:rPr lang="en-US" dirty="0">
+                <a:solidFill>
+                  <a:schemeClr val="accent3">
+                    <a:lumMod val="60000"/>
+                    <a:lumOff val="40000"/>
+                  </a:schemeClr>
+                </a:solidFill>
+                <a:highlight>
+                  <a:srgbClr val="808080"/>
+                </a:highlight>
+              </a:rPr>
+              <a:t>10</a:t>
+            </a:r>
+          </a:p>
+        </p:txBody>
+      </p:sp>
+      <p:pic>
+        <p:nvPicPr>
+          <p:cNvPr id="12" name="Picture 11" descr="A close-up of a black and white grid&#10;&#10;Description automatically generated">
+            <a:extLst>
+              <a:ext uri="{FF2B5EF4-FFF2-40B4-BE49-F238E27FC236}">
+                <a16:creationId xmlns:a16="http://schemas.microsoft.com/office/drawing/2014/main" id="{5EF21A22-B59D-2860-C04E-57CDB68271A7}"/>
+              </a:ext>
+            </a:extLst>
+          </p:cNvPr>
+          <p:cNvPicPr>
+            <a:picLocks noChangeAspect="1"/>
+          </p:cNvPicPr>
+          <p:nvPr/>
+        </p:nvPicPr>
+        <p:blipFill>
+          <a:blip r:embed="rId7">
+            <a:extLst>
+              <a:ext uri="{28A0092B-C50C-407E-A947-70E740481C1C}">
+                <a14:useLocalDpi xmlns:a14="http://schemas.microsoft.com/office/drawing/2010/main" val="0"/>
+              </a:ext>
+            </a:extLst>
+          </a:blip>
+          <a:stretch>
+            <a:fillRect/>
+          </a:stretch>
+        </p:blipFill>
+        <p:spPr>
+          <a:xfrm>
+            <a:off x="4002756" y="1471735"/>
+            <a:ext cx="2093244" cy="2093244"/>
+          </a:xfrm>
+          <a:prstGeom prst="rect">
+            <a:avLst/>
+          </a:prstGeom>
+        </p:spPr>
+      </p:pic>
+      <p:sp>
+        <p:nvSpPr>
+          <p:cNvPr id="15" name="TextBox 14">
+            <a:extLst>
+              <a:ext uri="{FF2B5EF4-FFF2-40B4-BE49-F238E27FC236}">
+                <a16:creationId xmlns:a16="http://schemas.microsoft.com/office/drawing/2014/main" id="{1C83AC2F-7A1B-E839-E55C-59965D1AEF8E}"/>
+              </a:ext>
+            </a:extLst>
+          </p:cNvPr>
+          <p:cNvSpPr txBox="1"/>
+          <p:nvPr/>
+        </p:nvSpPr>
+        <p:spPr>
+          <a:xfrm>
+            <a:off x="5603210" y="3195647"/>
+            <a:ext cx="492790" cy="369332"/>
+          </a:xfrm>
+          <a:prstGeom prst="rect">
+            <a:avLst/>
+          </a:prstGeom>
+          <a:noFill/>
+        </p:spPr>
+        <p:txBody>
+          <a:bodyPr wrap="square" rtlCol="0">
+            <a:spAutoFit/>
+          </a:bodyPr>
+          <a:lstStyle/>
+          <a:p>
+            <a:r>
+              <a:rPr lang="en-US" dirty="0">
+                <a:solidFill>
+                  <a:schemeClr val="accent3">
+                    <a:lumMod val="60000"/>
+                    <a:lumOff val="40000"/>
+                  </a:schemeClr>
+                </a:solidFill>
+                <a:highlight>
+                  <a:srgbClr val="808080"/>
+                </a:highlight>
+              </a:rPr>
+              <a:t>13</a:t>
+            </a:r>
+          </a:p>
+        </p:txBody>
+      </p:sp>
+      <p:sp>
+        <p:nvSpPr>
+          <p:cNvPr id="16" name="TextBox 15">
+            <a:extLst>
+              <a:ext uri="{FF2B5EF4-FFF2-40B4-BE49-F238E27FC236}">
+                <a16:creationId xmlns:a16="http://schemas.microsoft.com/office/drawing/2014/main" id="{0131179A-459C-4462-20AE-2191B3F2B48D}"/>
+              </a:ext>
+            </a:extLst>
+          </p:cNvPr>
+          <p:cNvSpPr txBox="1"/>
+          <p:nvPr/>
+        </p:nvSpPr>
+        <p:spPr>
+          <a:xfrm>
+            <a:off x="2634403" y="5669926"/>
+            <a:ext cx="492790" cy="369332"/>
+          </a:xfrm>
+          <a:prstGeom prst="rect">
+            <a:avLst/>
+          </a:prstGeom>
+          <a:noFill/>
+        </p:spPr>
+        <p:txBody>
+          <a:bodyPr wrap="square" rtlCol="0">
+            <a:spAutoFit/>
+          </a:bodyPr>
+          <a:lstStyle/>
+          <a:p>
+            <a:r>
+              <a:rPr lang="en-US" dirty="0">
+                <a:solidFill>
+                  <a:schemeClr val="accent3">
+                    <a:lumMod val="60000"/>
+                    <a:lumOff val="40000"/>
+                  </a:schemeClr>
+                </a:solidFill>
+                <a:highlight>
+                  <a:srgbClr val="808080"/>
+                </a:highlight>
+              </a:rPr>
+              <a:t>11</a:t>
+            </a:r>
+          </a:p>
+        </p:txBody>
+      </p:sp>
+      <p:sp>
+        <p:nvSpPr>
+          <p:cNvPr id="17" name="TextBox 16">
+            <a:extLst>
+              <a:ext uri="{FF2B5EF4-FFF2-40B4-BE49-F238E27FC236}">
+                <a16:creationId xmlns:a16="http://schemas.microsoft.com/office/drawing/2014/main" id="{71681ED2-7D1B-3370-1629-746AFBB4AB9D}"/>
+              </a:ext>
+            </a:extLst>
+          </p:cNvPr>
+          <p:cNvSpPr txBox="1"/>
+          <p:nvPr/>
+        </p:nvSpPr>
+        <p:spPr>
+          <a:xfrm>
+            <a:off x="5603210" y="5669926"/>
+            <a:ext cx="492790" cy="369332"/>
+          </a:xfrm>
+          <a:prstGeom prst="rect">
+            <a:avLst/>
+          </a:prstGeom>
+          <a:noFill/>
+        </p:spPr>
+        <p:txBody>
+          <a:bodyPr wrap="square" rtlCol="0">
+            <a:spAutoFit/>
+          </a:bodyPr>
+          <a:lstStyle/>
+          <a:p>
+            <a:r>
+              <a:rPr lang="en-US" dirty="0">
+                <a:solidFill>
+                  <a:schemeClr val="accent3">
+                    <a:lumMod val="60000"/>
+                    <a:lumOff val="40000"/>
+                  </a:schemeClr>
+                </a:solidFill>
+                <a:highlight>
+                  <a:srgbClr val="808080"/>
+                </a:highlight>
+              </a:rPr>
+              <a:t>12</a:t>
+            </a:r>
+          </a:p>
+        </p:txBody>
+      </p:sp>
+      <p:sp>
+        <p:nvSpPr>
+          <p:cNvPr id="18" name="TextBox 17">
+            <a:extLst>
+              <a:ext uri="{FF2B5EF4-FFF2-40B4-BE49-F238E27FC236}">
+                <a16:creationId xmlns:a16="http://schemas.microsoft.com/office/drawing/2014/main" id="{5A9339E7-5702-C1DD-20F8-73DA99A9CB81}"/>
+              </a:ext>
+            </a:extLst>
+          </p:cNvPr>
+          <p:cNvSpPr txBox="1"/>
+          <p:nvPr/>
+        </p:nvSpPr>
+        <p:spPr>
+          <a:xfrm>
+            <a:off x="8586962" y="5669926"/>
+            <a:ext cx="492790" cy="369332"/>
+          </a:xfrm>
+          <a:prstGeom prst="rect">
+            <a:avLst/>
+          </a:prstGeom>
+          <a:noFill/>
+        </p:spPr>
+        <p:txBody>
+          <a:bodyPr wrap="square" rtlCol="0">
+            <a:spAutoFit/>
+          </a:bodyPr>
+          <a:lstStyle/>
+          <a:p>
+            <a:r>
+              <a:rPr lang="en-US" dirty="0">
+                <a:solidFill>
+                  <a:schemeClr val="accent3">
+                    <a:lumMod val="60000"/>
+                    <a:lumOff val="40000"/>
+                  </a:schemeClr>
+                </a:solidFill>
+                <a:highlight>
+                  <a:srgbClr val="808080"/>
+                </a:highlight>
+              </a:rPr>
+              <a:t>14</a:t>
+            </a:r>
+          </a:p>
+        </p:txBody>
+      </p:sp>
+      <p:cxnSp>
+        <p:nvCxnSpPr>
+          <p:cNvPr id="27" name="Straight Arrow Connector 26">
+            <a:extLst>
+              <a:ext uri="{FF2B5EF4-FFF2-40B4-BE49-F238E27FC236}">
+                <a16:creationId xmlns:a16="http://schemas.microsoft.com/office/drawing/2014/main" id="{E93F0995-8E7F-3631-9145-BEB65D265838}"/>
+              </a:ext>
+            </a:extLst>
+          </p:cNvPr>
+          <p:cNvCxnSpPr>
+            <a:stCxn id="8" idx="2"/>
+            <a:endCxn id="20" idx="0"/>
+          </p:cNvCxnSpPr>
+          <p:nvPr/>
+        </p:nvCxnSpPr>
+        <p:spPr>
+          <a:xfrm>
+            <a:off x="2065625" y="3564979"/>
+            <a:ext cx="0" cy="381036"/>
+          </a:xfrm>
+          <a:prstGeom prst="straightConnector1">
+            <a:avLst/>
+          </a:prstGeom>
+          <a:ln>
+            <a:tailEnd type="triangle"/>
+          </a:ln>
+        </p:spPr>
+        <p:style>
+          <a:lnRef idx="1">
+            <a:schemeClr val="accent1"/>
+          </a:lnRef>
+          <a:fillRef idx="0">
+            <a:schemeClr val="accent1"/>
+          </a:fillRef>
+          <a:effectRef idx="0">
+            <a:schemeClr val="accent1"/>
+          </a:effectRef>
+          <a:fontRef idx="minor">
+            <a:schemeClr val="tx1"/>
+          </a:fontRef>
+        </p:style>
+      </p:cxnSp>
+      <p:cxnSp>
+        <p:nvCxnSpPr>
+          <p:cNvPr id="30" name="Straight Arrow Connector 29">
+            <a:extLst>
+              <a:ext uri="{FF2B5EF4-FFF2-40B4-BE49-F238E27FC236}">
+                <a16:creationId xmlns:a16="http://schemas.microsoft.com/office/drawing/2014/main" id="{2734829A-9749-C767-4D20-A430E2F3843B}"/>
+              </a:ext>
+            </a:extLst>
+          </p:cNvPr>
+          <p:cNvCxnSpPr>
+            <a:cxnSpLocks/>
+            <a:stCxn id="12" idx="2"/>
+            <a:endCxn id="22" idx="0"/>
+          </p:cNvCxnSpPr>
+          <p:nvPr/>
+        </p:nvCxnSpPr>
+        <p:spPr>
+          <a:xfrm>
+            <a:off x="5049378" y="3564979"/>
+            <a:ext cx="0" cy="383139"/>
+          </a:xfrm>
+          <a:prstGeom prst="straightConnector1">
+            <a:avLst/>
+          </a:prstGeom>
+          <a:ln>
+            <a:tailEnd type="triangle"/>
+          </a:ln>
+        </p:spPr>
+        <p:style>
+          <a:lnRef idx="1">
+            <a:schemeClr val="accent1"/>
+          </a:lnRef>
+          <a:fillRef idx="0">
+            <a:schemeClr val="accent1"/>
+          </a:fillRef>
+          <a:effectRef idx="0">
+            <a:schemeClr val="accent1"/>
+          </a:effectRef>
+          <a:fontRef idx="minor">
+            <a:schemeClr val="tx1"/>
+          </a:fontRef>
+        </p:style>
+      </p:cxnSp>
+      <p:cxnSp>
+        <p:nvCxnSpPr>
+          <p:cNvPr id="33" name="Straight Arrow Connector 32">
+            <a:extLst>
+              <a:ext uri="{FF2B5EF4-FFF2-40B4-BE49-F238E27FC236}">
+                <a16:creationId xmlns:a16="http://schemas.microsoft.com/office/drawing/2014/main" id="{9C72C0DF-35B8-4704-60F2-74AB5285872B}"/>
+              </a:ext>
+            </a:extLst>
+          </p:cNvPr>
+          <p:cNvCxnSpPr>
+            <a:stCxn id="14" idx="2"/>
+            <a:endCxn id="24" idx="0"/>
+          </p:cNvCxnSpPr>
+          <p:nvPr/>
+        </p:nvCxnSpPr>
+        <p:spPr>
+          <a:xfrm>
+            <a:off x="8033131" y="3564979"/>
+            <a:ext cx="0" cy="383139"/>
+          </a:xfrm>
+          <a:prstGeom prst="straightConnector1">
+            <a:avLst/>
+          </a:prstGeom>
+          <a:ln>
+            <a:tailEnd type="triangle"/>
+          </a:ln>
+        </p:spPr>
+        <p:style>
+          <a:lnRef idx="1">
+            <a:schemeClr val="accent1"/>
+          </a:lnRef>
+          <a:fillRef idx="0">
+            <a:schemeClr val="accent1"/>
+          </a:fillRef>
+          <a:effectRef idx="0">
+            <a:schemeClr val="accent1"/>
+          </a:effectRef>
+          <a:fontRef idx="minor">
+            <a:schemeClr val="tx1"/>
+          </a:fontRef>
+        </p:style>
+      </p:cxnSp>
+    </p:spTree>
+    <p:extLst>
+      <p:ext uri="{BB962C8B-B14F-4D97-AF65-F5344CB8AC3E}">
+        <p14:creationId xmlns:p14="http://schemas.microsoft.com/office/powerpoint/2010/main" val="4047375381"/>
       </p:ext>
     </p:extLst>
   </p:cSld>
@@ -7699,7 +9006,33 @@
           <a:p>
             <a:r>
               <a:rPr lang="en-US" dirty="0"/>
-              <a:t>For this project, </a:t>
+              <a:t>For this project, students are given 59 texture images</a:t>
+            </a:r>
+          </a:p>
+          <a:p>
+            <a:r>
+              <a:rPr lang="en-US" dirty="0"/>
+              <a:t>Feature vectors are calculated by extracting certain statistics (mean, variance, skewness, kurtosis) from the textures after two different methods of texture processing:</a:t>
+            </a:r>
+          </a:p>
+          <a:p>
+            <a:pPr lvl="1"/>
+            <a:r>
+              <a:rPr lang="en-US" dirty="0"/>
+              <a:t>Laplacian Pyramid</a:t>
+            </a:r>
+          </a:p>
+          <a:p>
+            <a:pPr lvl="1"/>
+            <a:r>
+              <a:rPr lang="en-US" dirty="0"/>
+              <a:t>Gabor Filter Bank</a:t>
+            </a:r>
+          </a:p>
+          <a:p>
+            <a:r>
+              <a:rPr lang="en-US" dirty="0"/>
+              <a:t>A percentage of correct classification (PCC) is calculated from the results to evaluate the filter performance under different statistic combinations. </a:t>
             </a:r>
           </a:p>
         </p:txBody>
@@ -7737,6 +9070,211 @@
     <p:extLst>
       <p:ext uri="{BB962C8B-B14F-4D97-AF65-F5344CB8AC3E}">
         <p14:creationId xmlns:p14="http://schemas.microsoft.com/office/powerpoint/2010/main" val="436677684"/>
+      </p:ext>
+    </p:extLst>
+  </p:cSld>
+  <p:clrMapOvr>
+    <a:masterClrMapping/>
+  </p:clrMapOvr>
+</p:sld>
+</file>
+
+<file path=ppt/slides/slide20.xml><?xml version="1.0" encoding="utf-8"?>
+<p:sld xmlns:a="http://schemas.openxmlformats.org/drawingml/2006/main" xmlns:r="http://schemas.openxmlformats.org/officeDocument/2006/relationships" xmlns:p="http://schemas.openxmlformats.org/presentationml/2006/main">
+  <p:cSld>
+    <p:spTree>
+      <p:nvGrpSpPr>
+        <p:cNvPr id="1" name=""/>
+        <p:cNvGrpSpPr/>
+        <p:nvPr/>
+      </p:nvGrpSpPr>
+      <p:grpSpPr>
+        <a:xfrm>
+          <a:off x="0" y="0"/>
+          <a:ext cx="0" cy="0"/>
+          <a:chOff x="0" y="0"/>
+          <a:chExt cx="0" cy="0"/>
+        </a:xfrm>
+      </p:grpSpPr>
+      <p:sp>
+        <p:nvSpPr>
+          <p:cNvPr id="2" name="Title 1">
+            <a:extLst>
+              <a:ext uri="{FF2B5EF4-FFF2-40B4-BE49-F238E27FC236}">
+                <a16:creationId xmlns:a16="http://schemas.microsoft.com/office/drawing/2014/main" id="{0978BC7C-0632-C147-305A-60B340730BF9}"/>
+              </a:ext>
+            </a:extLst>
+          </p:cNvPr>
+          <p:cNvSpPr>
+            <a:spLocks noGrp="1"/>
+          </p:cNvSpPr>
+          <p:nvPr>
+            <p:ph type="title"/>
+          </p:nvPr>
+        </p:nvSpPr>
+        <p:spPr/>
+        <p:txBody>
+          <a:bodyPr/>
+          <a:lstStyle/>
+          <a:p>
+            <a:r>
+              <a:rPr lang="en-US" dirty="0"/>
+              <a:t>Discussion and Conclusion</a:t>
+            </a:r>
+          </a:p>
+        </p:txBody>
+      </p:sp>
+      <p:sp>
+        <p:nvSpPr>
+          <p:cNvPr id="3" name="Content Placeholder 2">
+            <a:extLst>
+              <a:ext uri="{FF2B5EF4-FFF2-40B4-BE49-F238E27FC236}">
+                <a16:creationId xmlns:a16="http://schemas.microsoft.com/office/drawing/2014/main" id="{66552094-2F2A-1B32-4380-C417359657E2}"/>
+              </a:ext>
+            </a:extLst>
+          </p:cNvPr>
+          <p:cNvSpPr>
+            <a:spLocks noGrp="1"/>
+          </p:cNvSpPr>
+          <p:nvPr>
+            <p:ph idx="1"/>
+          </p:nvPr>
+        </p:nvSpPr>
+        <p:spPr/>
+        <p:txBody>
+          <a:bodyPr/>
+          <a:lstStyle/>
+          <a:p>
+            <a:r>
+              <a:rPr lang="en-US" dirty="0"/>
+              <a:t>Laplacian and Gabor both have good functionality, but clearly the Laplacian does not perform as well.</a:t>
+            </a:r>
+          </a:p>
+          <a:p>
+            <a:endParaRPr lang="en-US" dirty="0"/>
+          </a:p>
+        </p:txBody>
+      </p:sp>
+      <p:sp>
+        <p:nvSpPr>
+          <p:cNvPr id="5" name="Slide Number Placeholder 4">
+            <a:extLst>
+              <a:ext uri="{FF2B5EF4-FFF2-40B4-BE49-F238E27FC236}">
+                <a16:creationId xmlns:a16="http://schemas.microsoft.com/office/drawing/2014/main" id="{C395C6EC-FE0F-0BC0-D4C5-51E09090E166}"/>
+              </a:ext>
+            </a:extLst>
+          </p:cNvPr>
+          <p:cNvSpPr>
+            <a:spLocks noGrp="1"/>
+          </p:cNvSpPr>
+          <p:nvPr>
+            <p:ph type="sldNum" sz="quarter" idx="12"/>
+          </p:nvPr>
+        </p:nvSpPr>
+        <p:spPr/>
+        <p:txBody>
+          <a:bodyPr/>
+          <a:lstStyle/>
+          <a:p>
+            <a:fld id="{FAE858A7-4E67-4370-B4B5-094CAEAE4D8D}" type="slidenum">
+              <a:rPr lang="en-US" smtClean="0"/>
+              <a:t>20</a:t>
+            </a:fld>
+            <a:endParaRPr lang="en-US"/>
+          </a:p>
+        </p:txBody>
+      </p:sp>
+    </p:spTree>
+    <p:extLst>
+      <p:ext uri="{BB962C8B-B14F-4D97-AF65-F5344CB8AC3E}">
+        <p14:creationId xmlns:p14="http://schemas.microsoft.com/office/powerpoint/2010/main" val="1321214935"/>
+      </p:ext>
+    </p:extLst>
+  </p:cSld>
+  <p:clrMapOvr>
+    <a:masterClrMapping/>
+  </p:clrMapOvr>
+</p:sld>
+</file>
+
+<file path=ppt/slides/slide21.xml><?xml version="1.0" encoding="utf-8"?>
+<p:sld xmlns:a="http://schemas.openxmlformats.org/drawingml/2006/main" xmlns:r="http://schemas.openxmlformats.org/officeDocument/2006/relationships" xmlns:p="http://schemas.openxmlformats.org/presentationml/2006/main">
+  <p:cSld>
+    <p:spTree>
+      <p:nvGrpSpPr>
+        <p:cNvPr id="1" name=""/>
+        <p:cNvGrpSpPr/>
+        <p:nvPr/>
+      </p:nvGrpSpPr>
+      <p:grpSpPr>
+        <a:xfrm>
+          <a:off x="0" y="0"/>
+          <a:ext cx="0" cy="0"/>
+          <a:chOff x="0" y="0"/>
+          <a:chExt cx="0" cy="0"/>
+        </a:xfrm>
+      </p:grpSpPr>
+      <p:sp>
+        <p:nvSpPr>
+          <p:cNvPr id="2" name="Title 1">
+            <a:extLst>
+              <a:ext uri="{FF2B5EF4-FFF2-40B4-BE49-F238E27FC236}">
+                <a16:creationId xmlns:a16="http://schemas.microsoft.com/office/drawing/2014/main" id="{FF250D53-AC24-E1CC-A1C3-DE2218262E62}"/>
+              </a:ext>
+            </a:extLst>
+          </p:cNvPr>
+          <p:cNvSpPr>
+            <a:spLocks noGrp="1"/>
+          </p:cNvSpPr>
+          <p:nvPr>
+            <p:ph type="title"/>
+          </p:nvPr>
+        </p:nvSpPr>
+        <p:spPr/>
+        <p:txBody>
+          <a:bodyPr/>
+          <a:lstStyle/>
+          <a:p>
+            <a:r>
+              <a:rPr lang="en-US" dirty="0"/>
+              <a:t>Appendix – Code – Main file</a:t>
+            </a:r>
+          </a:p>
+        </p:txBody>
+      </p:sp>
+      <p:sp>
+        <p:nvSpPr>
+          <p:cNvPr id="4" name="Slide Number Placeholder 3">
+            <a:extLst>
+              <a:ext uri="{FF2B5EF4-FFF2-40B4-BE49-F238E27FC236}">
+                <a16:creationId xmlns:a16="http://schemas.microsoft.com/office/drawing/2014/main" id="{4BEAEDAB-60F8-9CDF-1300-8B3401975142}"/>
+              </a:ext>
+            </a:extLst>
+          </p:cNvPr>
+          <p:cNvSpPr>
+            <a:spLocks noGrp="1"/>
+          </p:cNvSpPr>
+          <p:nvPr>
+            <p:ph type="sldNum" sz="quarter" idx="12"/>
+          </p:nvPr>
+        </p:nvSpPr>
+        <p:spPr/>
+        <p:txBody>
+          <a:bodyPr/>
+          <a:lstStyle/>
+          <a:p>
+            <a:fld id="{FAE858A7-4E67-4370-B4B5-094CAEAE4D8D}" type="slidenum">
+              <a:rPr lang="en-US" smtClean="0"/>
+              <a:t>21</a:t>
+            </a:fld>
+            <a:endParaRPr lang="en-US"/>
+          </a:p>
+        </p:txBody>
+      </p:sp>
+    </p:spTree>
+    <p:extLst>
+      <p:ext uri="{BB962C8B-B14F-4D97-AF65-F5344CB8AC3E}">
+        <p14:creationId xmlns:p14="http://schemas.microsoft.com/office/powerpoint/2010/main" val="2220207043"/>
       </p:ext>
     </p:extLst>
   </p:cSld>
@@ -7877,10 +9415,10 @@
       </p:grpSpPr>
       <p:sp>
         <p:nvSpPr>
-          <p:cNvPr id="5" name="Title 4">
+          <p:cNvPr id="2" name="Title 1">
             <a:extLst>
               <a:ext uri="{FF2B5EF4-FFF2-40B4-BE49-F238E27FC236}">
-                <a16:creationId xmlns:a16="http://schemas.microsoft.com/office/drawing/2014/main" id="{3B23068E-E031-4C8F-DBC5-0D73D1B2F397}"/>
+                <a16:creationId xmlns:a16="http://schemas.microsoft.com/office/drawing/2014/main" id="{55175B88-31F0-5F96-321B-0EED5F409D2C}"/>
               </a:ext>
             </a:extLst>
           </p:cNvPr>
@@ -7898,17 +9436,17 @@
           <a:p>
             <a:r>
               <a:rPr lang="en-US" dirty="0"/>
-              <a:t>Experimental Results</a:t>
-            </a:r>
-          </a:p>
-        </p:txBody>
-      </p:sp>
-      <p:sp>
-        <p:nvSpPr>
-          <p:cNvPr id="6" name="Text Placeholder 5">
+              <a:t>Technical Background </a:t>
+            </a:r>
+          </a:p>
+        </p:txBody>
+      </p:sp>
+      <p:sp>
+        <p:nvSpPr>
+          <p:cNvPr id="3" name="Content Placeholder 2">
             <a:extLst>
               <a:ext uri="{FF2B5EF4-FFF2-40B4-BE49-F238E27FC236}">
-                <a16:creationId xmlns:a16="http://schemas.microsoft.com/office/drawing/2014/main" id="{4E5D5D9A-052B-E75B-B71E-CE1687B2449E}"/>
+                <a16:creationId xmlns:a16="http://schemas.microsoft.com/office/drawing/2014/main" id="{0FB23A22-214D-EAAD-BA17-AD9D16ECCD27}"/>
               </a:ext>
             </a:extLst>
           </p:cNvPr>
@@ -7916,7 +9454,7 @@
             <a:spLocks noGrp="1"/>
           </p:cNvSpPr>
           <p:nvPr>
-            <p:ph type="body" idx="1"/>
+            <p:ph idx="1"/>
           </p:nvPr>
         </p:nvSpPr>
         <p:spPr/>
@@ -7924,16 +9462,16 @@
           <a:bodyPr/>
           <a:lstStyle/>
           <a:p>
-            <a:endParaRPr lang="en-US"/>
-          </a:p>
-        </p:txBody>
-      </p:sp>
-      <p:sp>
-        <p:nvSpPr>
-          <p:cNvPr id="4" name="Slide Number Placeholder 3">
+            <a:endParaRPr lang="en-US" dirty="0"/>
+          </a:p>
+        </p:txBody>
+      </p:sp>
+      <p:sp>
+        <p:nvSpPr>
+          <p:cNvPr id="5" name="Slide Number Placeholder 4">
             <a:extLst>
               <a:ext uri="{FF2B5EF4-FFF2-40B4-BE49-F238E27FC236}">
-                <a16:creationId xmlns:a16="http://schemas.microsoft.com/office/drawing/2014/main" id="{65DF77CB-B6D2-23C7-56CC-1E43467B98A4}"/>
+                <a16:creationId xmlns:a16="http://schemas.microsoft.com/office/drawing/2014/main" id="{D7EFDD4C-433C-6D16-F6F1-DAF330878904}"/>
               </a:ext>
             </a:extLst>
           </p:cNvPr>
@@ -7960,7 +9498,7 @@
     </p:spTree>
     <p:extLst>
       <p:ext uri="{BB962C8B-B14F-4D97-AF65-F5344CB8AC3E}">
-        <p14:creationId xmlns:p14="http://schemas.microsoft.com/office/powerpoint/2010/main" val="22044305"/>
+        <p14:creationId xmlns:p14="http://schemas.microsoft.com/office/powerpoint/2010/main" val="2945255384"/>
       </p:ext>
     </p:extLst>
   </p:cSld>
@@ -7989,10 +9527,10 @@
       </p:grpSpPr>
       <p:sp>
         <p:nvSpPr>
-          <p:cNvPr id="5" name="Title 4">
+          <p:cNvPr id="2" name="Title 1">
             <a:extLst>
               <a:ext uri="{FF2B5EF4-FFF2-40B4-BE49-F238E27FC236}">
-                <a16:creationId xmlns:a16="http://schemas.microsoft.com/office/drawing/2014/main" id="{EBADF2D4-425F-3432-62B6-AB5DAC67848A}"/>
+                <a16:creationId xmlns:a16="http://schemas.microsoft.com/office/drawing/2014/main" id="{55175B88-31F0-5F96-321B-0EED5F409D2C}"/>
               </a:ext>
             </a:extLst>
           </p:cNvPr>
@@ -8010,17 +9548,17 @@
           <a:p>
             <a:r>
               <a:rPr lang="en-US" dirty="0"/>
-              <a:t>General process</a:t>
-            </a:r>
-          </a:p>
-        </p:txBody>
-      </p:sp>
-      <p:sp>
-        <p:nvSpPr>
-          <p:cNvPr id="6" name="Content Placeholder 5">
+              <a:t>Technical Background </a:t>
+            </a:r>
+          </a:p>
+        </p:txBody>
+      </p:sp>
+      <p:sp>
+        <p:nvSpPr>
+          <p:cNvPr id="3" name="Content Placeholder 2">
             <a:extLst>
               <a:ext uri="{FF2B5EF4-FFF2-40B4-BE49-F238E27FC236}">
-                <a16:creationId xmlns:a16="http://schemas.microsoft.com/office/drawing/2014/main" id="{06199DE9-861C-D872-01E9-0A035087C226}"/>
+                <a16:creationId xmlns:a16="http://schemas.microsoft.com/office/drawing/2014/main" id="{0FB23A22-214D-EAAD-BA17-AD9D16ECCD27}"/>
               </a:ext>
             </a:extLst>
           </p:cNvPr>
@@ -8036,19 +9574,16 @@
           <a:bodyPr/>
           <a:lstStyle/>
           <a:p>
-            <a:r>
-              <a:rPr lang="en-US" dirty="0"/>
-              <a:t>I</a:t>
-            </a:r>
-          </a:p>
-        </p:txBody>
-      </p:sp>
-      <p:sp>
-        <p:nvSpPr>
-          <p:cNvPr id="4" name="Slide Number Placeholder 3">
+            <a:endParaRPr lang="en-US" dirty="0"/>
+          </a:p>
+        </p:txBody>
+      </p:sp>
+      <p:sp>
+        <p:nvSpPr>
+          <p:cNvPr id="5" name="Slide Number Placeholder 4">
             <a:extLst>
               <a:ext uri="{FF2B5EF4-FFF2-40B4-BE49-F238E27FC236}">
-                <a16:creationId xmlns:a16="http://schemas.microsoft.com/office/drawing/2014/main" id="{76199A3C-4F35-3BD1-F235-DFC4C9391C8A}"/>
+                <a16:creationId xmlns:a16="http://schemas.microsoft.com/office/drawing/2014/main" id="{D7EFDD4C-433C-6D16-F6F1-DAF330878904}"/>
               </a:ext>
             </a:extLst>
           </p:cNvPr>
@@ -8075,7 +9610,7 @@
     </p:spTree>
     <p:extLst>
       <p:ext uri="{BB962C8B-B14F-4D97-AF65-F5344CB8AC3E}">
-        <p14:creationId xmlns:p14="http://schemas.microsoft.com/office/powerpoint/2010/main" val="1516397924"/>
+        <p14:creationId xmlns:p14="http://schemas.microsoft.com/office/powerpoint/2010/main" val="2922917693"/>
       </p:ext>
     </p:extLst>
   </p:cSld>
@@ -8104,10 +9639,10 @@
       </p:grpSpPr>
       <p:sp>
         <p:nvSpPr>
-          <p:cNvPr id="3" name="Title 2">
+          <p:cNvPr id="5" name="Title 4">
             <a:extLst>
               <a:ext uri="{FF2B5EF4-FFF2-40B4-BE49-F238E27FC236}">
-                <a16:creationId xmlns:a16="http://schemas.microsoft.com/office/drawing/2014/main" id="{0A6ED9D5-4D01-221A-05CA-AA59656D44F6}"/>
+                <a16:creationId xmlns:a16="http://schemas.microsoft.com/office/drawing/2014/main" id="{3B23068E-E031-4C8F-DBC5-0D73D1B2F397}"/>
               </a:ext>
             </a:extLst>
           </p:cNvPr>
@@ -8125,17 +9660,17 @@
           <a:p>
             <a:r>
               <a:rPr lang="en-US" dirty="0"/>
-              <a:t>Observations – Mean All Layers</a:t>
-            </a:r>
-          </a:p>
-        </p:txBody>
-      </p:sp>
-      <p:sp>
-        <p:nvSpPr>
-          <p:cNvPr id="7" name="Content Placeholder 6">
+              <a:t>Experimental Results</a:t>
+            </a:r>
+          </a:p>
+        </p:txBody>
+      </p:sp>
+      <p:sp>
+        <p:nvSpPr>
+          <p:cNvPr id="6" name="Text Placeholder 5">
             <a:extLst>
               <a:ext uri="{FF2B5EF4-FFF2-40B4-BE49-F238E27FC236}">
-                <a16:creationId xmlns:a16="http://schemas.microsoft.com/office/drawing/2014/main" id="{20001557-FA60-7D85-2BB8-88D7E1C2F492}"/>
+                <a16:creationId xmlns:a16="http://schemas.microsoft.com/office/drawing/2014/main" id="{4E5D5D9A-052B-E75B-B71E-CE1687B2449E}"/>
               </a:ext>
             </a:extLst>
           </p:cNvPr>
@@ -8143,74 +9678,24 @@
             <a:spLocks noGrp="1"/>
           </p:cNvSpPr>
           <p:nvPr>
-            <p:ph idx="1"/>
+            <p:ph type="body" idx="1"/>
           </p:nvPr>
         </p:nvSpPr>
         <p:spPr/>
         <p:txBody>
-          <a:bodyPr>
-            <a:normAutofit fontScale="92500" lnSpcReduction="20000"/>
-          </a:bodyPr>
-          <a:lstStyle/>
-          <a:p>
-            <a:r>
-              <a:rPr lang="en-US" dirty="0"/>
-              <a:t>Number of Layers = 1   10.7797</a:t>
-            </a:r>
-          </a:p>
-          <a:p>
-            <a:endParaRPr lang="en-US" dirty="0"/>
-          </a:p>
-          <a:p>
-            <a:r>
-              <a:rPr lang="en-US" dirty="0"/>
-              <a:t>Number of Layers = 2    2.8983</a:t>
-            </a:r>
-          </a:p>
-          <a:p>
-            <a:endParaRPr lang="en-US" dirty="0"/>
-          </a:p>
-          <a:p>
-            <a:r>
-              <a:rPr lang="en-US" dirty="0"/>
-              <a:t>Number of Layers = 3    2.5424</a:t>
-            </a:r>
-          </a:p>
-          <a:p>
-            <a:endParaRPr lang="en-US" dirty="0"/>
-          </a:p>
-          <a:p>
-            <a:r>
-              <a:rPr lang="en-US" dirty="0"/>
-              <a:t>Number of Layers = 4    2.5593</a:t>
-            </a:r>
-          </a:p>
-          <a:p>
-            <a:endParaRPr lang="en-US" dirty="0"/>
-          </a:p>
-          <a:p>
-            <a:r>
-              <a:rPr lang="en-US" dirty="0"/>
-              <a:t>Number of Layers = 5    2.8644</a:t>
-            </a:r>
-          </a:p>
-          <a:p>
-            <a:endParaRPr lang="en-US" dirty="0"/>
-          </a:p>
-          <a:p>
-            <a:r>
-              <a:rPr lang="en-US" dirty="0"/>
-              <a:t>Best Laplacian PCC is 10.780000% accurate with 1 Layers</a:t>
-            </a:r>
-          </a:p>
-        </p:txBody>
-      </p:sp>
-      <p:sp>
-        <p:nvSpPr>
-          <p:cNvPr id="2" name="Slide Number Placeholder 1">
+          <a:bodyPr/>
+          <a:lstStyle/>
+          <a:p>
+            <a:endParaRPr lang="en-US"/>
+          </a:p>
+        </p:txBody>
+      </p:sp>
+      <p:sp>
+        <p:nvSpPr>
+          <p:cNvPr id="4" name="Slide Number Placeholder 3">
             <a:extLst>
               <a:ext uri="{FF2B5EF4-FFF2-40B4-BE49-F238E27FC236}">
-                <a16:creationId xmlns:a16="http://schemas.microsoft.com/office/drawing/2014/main" id="{76E131D6-732B-A6A6-EC27-20DD088AC8B1}"/>
+                <a16:creationId xmlns:a16="http://schemas.microsoft.com/office/drawing/2014/main" id="{65DF77CB-B6D2-23C7-56CC-1E43467B98A4}"/>
               </a:ext>
             </a:extLst>
           </p:cNvPr>
@@ -8237,7 +9722,7 @@
     </p:spTree>
     <p:extLst>
       <p:ext uri="{BB962C8B-B14F-4D97-AF65-F5344CB8AC3E}">
-        <p14:creationId xmlns:p14="http://schemas.microsoft.com/office/powerpoint/2010/main" val="1394698432"/>
+        <p14:creationId xmlns:p14="http://schemas.microsoft.com/office/powerpoint/2010/main" val="22044305"/>
       </p:ext>
     </p:extLst>
   </p:cSld>
@@ -8266,10 +9751,10 @@
       </p:grpSpPr>
       <p:sp>
         <p:nvSpPr>
-          <p:cNvPr id="6" name="Title 5">
+          <p:cNvPr id="5" name="Title 4">
             <a:extLst>
               <a:ext uri="{FF2B5EF4-FFF2-40B4-BE49-F238E27FC236}">
-                <a16:creationId xmlns:a16="http://schemas.microsoft.com/office/drawing/2014/main" id="{6CE6A214-F671-652C-E904-D3EEBD96CB19}"/>
+                <a16:creationId xmlns:a16="http://schemas.microsoft.com/office/drawing/2014/main" id="{EBADF2D4-425F-3432-62B6-AB5DAC67848A}"/>
               </a:ext>
             </a:extLst>
           </p:cNvPr>
@@ -8287,17 +9772,17 @@
           <a:p>
             <a:r>
               <a:rPr lang="en-US" dirty="0"/>
-              <a:t>Observations – Variance All Layers</a:t>
-            </a:r>
-          </a:p>
-        </p:txBody>
-      </p:sp>
-      <p:sp>
-        <p:nvSpPr>
-          <p:cNvPr id="7" name="Content Placeholder 6">
+              <a:t>General process</a:t>
+            </a:r>
+          </a:p>
+        </p:txBody>
+      </p:sp>
+      <p:sp>
+        <p:nvSpPr>
+          <p:cNvPr id="6" name="Content Placeholder 5">
             <a:extLst>
               <a:ext uri="{FF2B5EF4-FFF2-40B4-BE49-F238E27FC236}">
-                <a16:creationId xmlns:a16="http://schemas.microsoft.com/office/drawing/2014/main" id="{99B16345-D877-FE81-27F0-BC411183D798}"/>
+                <a16:creationId xmlns:a16="http://schemas.microsoft.com/office/drawing/2014/main" id="{06199DE9-861C-D872-01E9-0A035087C226}"/>
               </a:ext>
             </a:extLst>
           </p:cNvPr>
@@ -8310,69 +9795,47 @@
         </p:nvSpPr>
         <p:spPr/>
         <p:txBody>
-          <a:bodyPr>
-            <a:normAutofit fontScale="92500" lnSpcReduction="20000"/>
-          </a:bodyPr>
+          <a:bodyPr/>
           <a:lstStyle/>
           <a:p>
             <a:r>
               <a:rPr lang="en-US" dirty="0"/>
-              <a:t>Number of Layers = 1   12.3390</a:t>
-            </a:r>
-          </a:p>
-          <a:p>
-            <a:endParaRPr lang="en-US" dirty="0"/>
-          </a:p>
-          <a:p>
+              <a:t>I first converted each image into a double and assigned to an array of images (640x640x59)</a:t>
+            </a:r>
+          </a:p>
+          <a:p>
+            <a:pPr lvl="1"/>
             <a:r>
               <a:rPr lang="en-US" dirty="0"/>
-              <a:t>Number of Layers = 2   39.7458</a:t>
-            </a:r>
-          </a:p>
-          <a:p>
-            <a:endParaRPr lang="en-US" dirty="0"/>
+              <a:t>Each image was further split into 100 blocks, resulting in a second array (64x64x5900) to be used for classification testing</a:t>
+            </a:r>
           </a:p>
           <a:p>
             <a:r>
               <a:rPr lang="en-US" dirty="0"/>
-              <a:t>Number of Layers = 3   50.5932</a:t>
-            </a:r>
-          </a:p>
-          <a:p>
-            <a:endParaRPr lang="en-US" dirty="0"/>
+              <a:t>Next, I calculated the Laplacian pyramid of each image and each block at various number of layers and saved the feature vectors in a file (one for each layer with 5 layers tested)</a:t>
+            </a:r>
           </a:p>
           <a:p>
             <a:r>
               <a:rPr lang="en-US" dirty="0"/>
-              <a:t>Number of Layers = 4   56.0169</a:t>
-            </a:r>
-          </a:p>
-          <a:p>
-            <a:endParaRPr lang="en-US" dirty="0"/>
+              <a:t>Next, I calculated the Gabor filter bank and found feature vectors for each scale/orientation combination from 1 scale one orientation to 5 scales 6 orientations. These were also saved to files (for a total of 30 combinations)</a:t>
+            </a:r>
           </a:p>
           <a:p>
             <a:r>
               <a:rPr lang="en-US" dirty="0"/>
-              <a:t>Number of Layers = 5   54.4068</a:t>
-            </a:r>
-          </a:p>
-          <a:p>
-            <a:endParaRPr lang="en-US" dirty="0"/>
-          </a:p>
-          <a:p>
-            <a:r>
-              <a:rPr lang="en-US" dirty="0"/>
-              <a:t>Best Laplacian PCC is 56.020000% accurate with 4 Layers</a:t>
-            </a:r>
-          </a:p>
-        </p:txBody>
-      </p:sp>
-      <p:sp>
-        <p:nvSpPr>
-          <p:cNvPr id="5" name="Slide Number Placeholder 4">
+              <a:t>Last, I classified the textures statistics from the feature vectors to find the best result. </a:t>
+            </a:r>
+          </a:p>
+        </p:txBody>
+      </p:sp>
+      <p:sp>
+        <p:nvSpPr>
+          <p:cNvPr id="4" name="Slide Number Placeholder 3">
             <a:extLst>
               <a:ext uri="{FF2B5EF4-FFF2-40B4-BE49-F238E27FC236}">
-                <a16:creationId xmlns:a16="http://schemas.microsoft.com/office/drawing/2014/main" id="{BDC554BC-4CE8-6077-7D9B-5B1B66D1817A}"/>
+                <a16:creationId xmlns:a16="http://schemas.microsoft.com/office/drawing/2014/main" id="{76199A3C-4F35-3BD1-F235-DFC4C9391C8A}"/>
               </a:ext>
             </a:extLst>
           </p:cNvPr>
@@ -8399,7 +9862,7 @@
     </p:spTree>
     <p:extLst>
       <p:ext uri="{BB962C8B-B14F-4D97-AF65-F5344CB8AC3E}">
-        <p14:creationId xmlns:p14="http://schemas.microsoft.com/office/powerpoint/2010/main" val="387152840"/>
+        <p14:creationId xmlns:p14="http://schemas.microsoft.com/office/powerpoint/2010/main" val="1516397924"/>
       </p:ext>
     </p:extLst>
   </p:cSld>
@@ -8431,7 +9894,7 @@
           <p:cNvPr id="2" name="Title 1">
             <a:extLst>
               <a:ext uri="{FF2B5EF4-FFF2-40B4-BE49-F238E27FC236}">
-                <a16:creationId xmlns:a16="http://schemas.microsoft.com/office/drawing/2014/main" id="{B1030559-28BB-66AD-2F26-8ABF17004FD0}"/>
+                <a16:creationId xmlns:a16="http://schemas.microsoft.com/office/drawing/2014/main" id="{A8DD6DB9-58E6-CE7A-F448-8A8A65CEA284}"/>
               </a:ext>
             </a:extLst>
           </p:cNvPr>
@@ -8449,7 +9912,7 @@
           <a:p>
             <a:r>
               <a:rPr lang="en-US" dirty="0"/>
-              <a:t>Observations – Skew all layers</a:t>
+              <a:t>Laplacian</a:t>
             </a:r>
           </a:p>
         </p:txBody>
@@ -8459,7 +9922,7 @@
           <p:cNvPr id="3" name="Content Placeholder 2">
             <a:extLst>
               <a:ext uri="{FF2B5EF4-FFF2-40B4-BE49-F238E27FC236}">
-                <a16:creationId xmlns:a16="http://schemas.microsoft.com/office/drawing/2014/main" id="{14C757AF-FC5C-6B9C-B060-0C4B046AF918}"/>
+                <a16:creationId xmlns:a16="http://schemas.microsoft.com/office/drawing/2014/main" id="{E1073942-84DB-90E9-52BF-6E95702A2BD7}"/>
               </a:ext>
             </a:extLst>
           </p:cNvPr>
@@ -8470,16 +9933,27 @@
             <p:ph idx="1"/>
           </p:nvPr>
         </p:nvSpPr>
-        <p:spPr/>
+        <p:spPr>
+          <a:xfrm>
+            <a:off x="677334" y="1407190"/>
+            <a:ext cx="8596668" cy="4841209"/>
+          </a:xfrm>
+        </p:spPr>
         <p:txBody>
           <a:bodyPr>
-            <a:normAutofit fontScale="92500" lnSpcReduction="20000"/>
+            <a:normAutofit fontScale="92500" lnSpcReduction="10000"/>
           </a:bodyPr>
           <a:lstStyle/>
           <a:p>
             <a:r>
               <a:rPr lang="en-US" dirty="0"/>
-              <a:t>Number of Layers = 1   15.7288</a:t>
+              <a:t>The Laplacian pyramid was first tested with all statistics, and it performed very poorly at all layers, output shown below. Following this, I tested individual statistics at all layers to see where they performed best, shown in following slides</a:t>
+            </a:r>
+          </a:p>
+          <a:p>
+            <a:r>
+              <a:rPr lang="en-US" dirty="0"/>
+              <a:t>Number of Layers = 1   43.2712</a:t>
             </a:r>
           </a:p>
           <a:p>
@@ -8488,7 +9962,7 @@
           <a:p>
             <a:r>
               <a:rPr lang="en-US" dirty="0"/>
-              <a:t>Number of Layers = 2   26.9322</a:t>
+              <a:t>Number of Layers = 2   10.3729</a:t>
             </a:r>
           </a:p>
           <a:p>
@@ -8497,7 +9971,7 @@
           <a:p>
             <a:r>
               <a:rPr lang="en-US" dirty="0"/>
-              <a:t>Number of Layers = 3   32.3559</a:t>
+              <a:t>Number of Layers = 3    8.5254</a:t>
             </a:r>
           </a:p>
           <a:p>
@@ -8506,7 +9980,7 @@
           <a:p>
             <a:r>
               <a:rPr lang="en-US" dirty="0"/>
-              <a:t>Number of Layers = 4   26.2542</a:t>
+              <a:t>Number of Layers = 4    7.5593</a:t>
             </a:r>
           </a:p>
           <a:p>
@@ -8515,7 +9989,7 @@
           <a:p>
             <a:r>
               <a:rPr lang="en-US" dirty="0"/>
-              <a:t>Number of Layers = 5   17.4068</a:t>
+              <a:t>Number of Layers = 5    7.7119</a:t>
             </a:r>
           </a:p>
           <a:p>
@@ -8524,7 +9998,7 @@
           <a:p>
             <a:r>
               <a:rPr lang="en-US" dirty="0"/>
-              <a:t>Best Laplacian PCC is 32.360000% accurate with 3 Layers</a:t>
+              <a:t>Best Laplacian PCC is 43.270000% accurate with 1 Layers</a:t>
             </a:r>
           </a:p>
         </p:txBody>
@@ -8534,7 +10008,7 @@
           <p:cNvPr id="4" name="Slide Number Placeholder 3">
             <a:extLst>
               <a:ext uri="{FF2B5EF4-FFF2-40B4-BE49-F238E27FC236}">
-                <a16:creationId xmlns:a16="http://schemas.microsoft.com/office/drawing/2014/main" id="{C0BF565F-E842-C37C-3FE0-F887D90695AC}"/>
+                <a16:creationId xmlns:a16="http://schemas.microsoft.com/office/drawing/2014/main" id="{BBAE94E6-3502-7DB3-3DFC-678A4223D527}"/>
               </a:ext>
             </a:extLst>
           </p:cNvPr>
@@ -8561,7 +10035,7 @@
     </p:spTree>
     <p:extLst>
       <p:ext uri="{BB962C8B-B14F-4D97-AF65-F5344CB8AC3E}">
-        <p14:creationId xmlns:p14="http://schemas.microsoft.com/office/powerpoint/2010/main" val="1010374374"/>
+        <p14:creationId xmlns:p14="http://schemas.microsoft.com/office/powerpoint/2010/main" val="375350324"/>
       </p:ext>
     </p:extLst>
   </p:cSld>
@@ -8590,10 +10064,10 @@
       </p:grpSpPr>
       <p:sp>
         <p:nvSpPr>
-          <p:cNvPr id="2" name="Title 1">
+          <p:cNvPr id="3" name="Title 2">
             <a:extLst>
               <a:ext uri="{FF2B5EF4-FFF2-40B4-BE49-F238E27FC236}">
-                <a16:creationId xmlns:a16="http://schemas.microsoft.com/office/drawing/2014/main" id="{F5212A34-2FCD-8ED9-70E7-1B09E675CF32}"/>
+                <a16:creationId xmlns:a16="http://schemas.microsoft.com/office/drawing/2014/main" id="{0A6ED9D5-4D01-221A-05CA-AA59656D44F6}"/>
               </a:ext>
             </a:extLst>
           </p:cNvPr>
@@ -8611,17 +10085,17 @@
           <a:p>
             <a:r>
               <a:rPr lang="en-US" dirty="0"/>
-              <a:t>Observations – Kurtosis all layers</a:t>
-            </a:r>
-          </a:p>
-        </p:txBody>
-      </p:sp>
-      <p:sp>
-        <p:nvSpPr>
-          <p:cNvPr id="3" name="Content Placeholder 2">
+              <a:t>Observations – Mean All Layers</a:t>
+            </a:r>
+          </a:p>
+        </p:txBody>
+      </p:sp>
+      <p:sp>
+        <p:nvSpPr>
+          <p:cNvPr id="7" name="Content Placeholder 6">
             <a:extLst>
               <a:ext uri="{FF2B5EF4-FFF2-40B4-BE49-F238E27FC236}">
-                <a16:creationId xmlns:a16="http://schemas.microsoft.com/office/drawing/2014/main" id="{15F0A204-B8E5-F70E-9B04-D59B3BB9824C}"/>
+                <a16:creationId xmlns:a16="http://schemas.microsoft.com/office/drawing/2014/main" id="{20001557-FA60-7D85-2BB8-88D7E1C2F492}"/>
               </a:ext>
             </a:extLst>
           </p:cNvPr>
@@ -8641,7 +10115,7 @@
           <a:p>
             <a:r>
               <a:rPr lang="en-US" dirty="0"/>
-              <a:t>Number of Layers = 1   14.8305</a:t>
+              <a:t>Number of Layers = 1   10.7797</a:t>
             </a:r>
           </a:p>
           <a:p>
@@ -8650,7 +10124,7 @@
           <a:p>
             <a:r>
               <a:rPr lang="en-US" dirty="0"/>
-              <a:t>Number of Layers = 2   33.8305</a:t>
+              <a:t>Number of Layers = 2    2.8983</a:t>
             </a:r>
           </a:p>
           <a:p>
@@ -8659,7 +10133,7 @@
           <a:p>
             <a:r>
               <a:rPr lang="en-US" dirty="0"/>
-              <a:t>Number of Layers = 3   34.1695</a:t>
+              <a:t>Number of Layers = 3    2.5424</a:t>
             </a:r>
           </a:p>
           <a:p>
@@ -8668,7 +10142,7 @@
           <a:p>
             <a:r>
               <a:rPr lang="en-US" dirty="0"/>
-              <a:t>Number of Layers = 4   21.0339</a:t>
+              <a:t>Number of Layers = 4    2.5593</a:t>
             </a:r>
           </a:p>
           <a:p>
@@ -8677,7 +10151,7 @@
           <a:p>
             <a:r>
               <a:rPr lang="en-US" dirty="0"/>
-              <a:t>Number of Layers = 5   15.1525</a:t>
+              <a:t>Number of Layers = 5    2.8644</a:t>
             </a:r>
           </a:p>
           <a:p>
@@ -8686,17 +10160,17 @@
           <a:p>
             <a:r>
               <a:rPr lang="en-US" dirty="0"/>
-              <a:t>Best Laplacian PCC is 34.170000% accurate with 3 Layers</a:t>
-            </a:r>
-          </a:p>
-        </p:txBody>
-      </p:sp>
-      <p:sp>
-        <p:nvSpPr>
-          <p:cNvPr id="4" name="Slide Number Placeholder 3">
+              <a:t>Best Laplacian PCC is 10.780000% accurate with 1 Layers</a:t>
+            </a:r>
+          </a:p>
+        </p:txBody>
+      </p:sp>
+      <p:sp>
+        <p:nvSpPr>
+          <p:cNvPr id="2" name="Slide Number Placeholder 1">
             <a:extLst>
               <a:ext uri="{FF2B5EF4-FFF2-40B4-BE49-F238E27FC236}">
-                <a16:creationId xmlns:a16="http://schemas.microsoft.com/office/drawing/2014/main" id="{8AD134FF-C139-1E4F-41C0-DACB8E5B52B8}"/>
+                <a16:creationId xmlns:a16="http://schemas.microsoft.com/office/drawing/2014/main" id="{76E131D6-732B-A6A6-EC27-20DD088AC8B1}"/>
               </a:ext>
             </a:extLst>
           </p:cNvPr>
@@ -8723,7 +10197,7 @@
     </p:spTree>
     <p:extLst>
       <p:ext uri="{BB962C8B-B14F-4D97-AF65-F5344CB8AC3E}">
-        <p14:creationId xmlns:p14="http://schemas.microsoft.com/office/powerpoint/2010/main" val="2551005335"/>
+        <p14:creationId xmlns:p14="http://schemas.microsoft.com/office/powerpoint/2010/main" val="1394698432"/>
       </p:ext>
     </p:extLst>
   </p:cSld>

</xml_diff>